<commit_message>
Updated assignments and homework
</commit_message>
<xml_diff>
--- a/classes/winter_2023/lectures/lecture_11-system-identification/system_identification.pptx
+++ b/classes/winter_2023/lectures/lecture_11-system-identification/system_identification.pptx
@@ -18,13 +18,13 @@
     <p:sldId id="504" r:id="rId6"/>
     <p:sldId id="354" r:id="rId7"/>
     <p:sldId id="355" r:id="rId8"/>
-    <p:sldId id="359" r:id="rId9"/>
-    <p:sldId id="267" r:id="rId10"/>
-    <p:sldId id="269" r:id="rId11"/>
-    <p:sldId id="503" r:id="rId12"/>
-    <p:sldId id="270" r:id="rId13"/>
-    <p:sldId id="263" r:id="rId14"/>
-    <p:sldId id="262" r:id="rId15"/>
+    <p:sldId id="263" r:id="rId9"/>
+    <p:sldId id="262" r:id="rId10"/>
+    <p:sldId id="359" r:id="rId11"/>
+    <p:sldId id="267" r:id="rId12"/>
+    <p:sldId id="269" r:id="rId13"/>
+    <p:sldId id="503" r:id="rId14"/>
+    <p:sldId id="270" r:id="rId15"/>
     <p:sldId id="356" r:id="rId16"/>
     <p:sldId id="505" r:id="rId17"/>
   </p:sldIdLst>
@@ -289,7 +289,7 @@
               <a:pPr>
                 <a:defRPr/>
               </a:pPr>
-              <a:t>2/11/23</a:t>
+              <a:t>2/12/23</a:t>
             </a:fld>
             <a:endParaRPr lang="en-US" altLang="x-none"/>
           </a:p>
@@ -498,7 +498,7 @@
               <a:pPr>
                 <a:defRPr/>
               </a:pPr>
-              <a:t>2/11/23</a:t>
+              <a:t>2/12/23</a:t>
             </a:fld>
             <a:endParaRPr lang="en-US" altLang="x-none"/>
           </a:p>
@@ -5296,6 +5296,958 @@
       </p:grpSpPr>
       <p:sp>
         <p:nvSpPr>
+          <p:cNvPr id="2" name="Title 1">
+            <a:extLst>
+              <a:ext uri="{FF2B5EF4-FFF2-40B4-BE49-F238E27FC236}">
+                <a16:creationId xmlns:a16="http://schemas.microsoft.com/office/drawing/2014/main" id="{EDF021D6-61A7-274E-A332-2D0E2CA02CA3}"/>
+              </a:ext>
+            </a:extLst>
+          </p:cNvPr>
+          <p:cNvSpPr>
+            <a:spLocks noGrp="1"/>
+          </p:cNvSpPr>
+          <p:nvPr>
+            <p:ph type="title"/>
+          </p:nvPr>
+        </p:nvSpPr>
+        <p:spPr/>
+        <p:txBody>
+          <a:bodyPr/>
+          <a:lstStyle/>
+          <a:p>
+            <a:r>
+              <a:rPr lang="en-US" dirty="0"/>
+              <a:t>What Residuals Tell Us About Models</a:t>
+            </a:r>
+          </a:p>
+        </p:txBody>
+      </p:sp>
+      <p:sp>
+        <p:nvSpPr>
+          <p:cNvPr id="3" name="Slide Number Placeholder 2">
+            <a:extLst>
+              <a:ext uri="{FF2B5EF4-FFF2-40B4-BE49-F238E27FC236}">
+                <a16:creationId xmlns:a16="http://schemas.microsoft.com/office/drawing/2014/main" id="{BA82D6E1-D053-7F46-B22C-11F5D8AD40BA}"/>
+              </a:ext>
+            </a:extLst>
+          </p:cNvPr>
+          <p:cNvSpPr>
+            <a:spLocks noGrp="1"/>
+          </p:cNvSpPr>
+          <p:nvPr>
+            <p:ph type="sldNum" sz="quarter" idx="11"/>
+          </p:nvPr>
+        </p:nvSpPr>
+        <p:spPr/>
+        <p:txBody>
+          <a:bodyPr/>
+          <a:lstStyle/>
+          <a:p>
+            <a:pPr>
+              <a:defRPr/>
+            </a:pPr>
+            <a:fld id="{2E4304A7-0FB2-4094-BC1E-DB17183AD0C1}" type="slidenum">
+              <a:rPr lang="en-US" altLang="x-none" smtClean="0"/>
+              <a:pPr>
+                <a:defRPr/>
+              </a:pPr>
+              <a:t>10</a:t>
+            </a:fld>
+            <a:endParaRPr lang="en-US" altLang="x-none"/>
+          </a:p>
+        </p:txBody>
+      </p:sp>
+      <p:grpSp>
+        <p:nvGrpSpPr>
+          <p:cNvPr id="17" name="Group 16">
+            <a:extLst>
+              <a:ext uri="{FF2B5EF4-FFF2-40B4-BE49-F238E27FC236}">
+                <a16:creationId xmlns:a16="http://schemas.microsoft.com/office/drawing/2014/main" id="{F073A3CB-0F31-3445-B8D3-1B08798BE47D}"/>
+              </a:ext>
+            </a:extLst>
+          </p:cNvPr>
+          <p:cNvGrpSpPr/>
+          <p:nvPr/>
+        </p:nvGrpSpPr>
+        <p:grpSpPr>
+          <a:xfrm>
+            <a:off x="5143500" y="1450875"/>
+            <a:ext cx="2071205" cy="2092426"/>
+            <a:chOff x="5334000" y="791499"/>
+            <a:chExt cx="2761606" cy="2789901"/>
+          </a:xfrm>
+        </p:grpSpPr>
+        <p:pic>
+          <p:nvPicPr>
+            <p:cNvPr id="9" name="Picture 8">
+              <a:extLst>
+                <a:ext uri="{FF2B5EF4-FFF2-40B4-BE49-F238E27FC236}">
+                  <a16:creationId xmlns:a16="http://schemas.microsoft.com/office/drawing/2014/main" id="{19A1125C-DB23-BD43-A4FB-C38B33AE9CED}"/>
+                </a:ext>
+              </a:extLst>
+            </p:cNvPr>
+            <p:cNvPicPr>
+              <a:picLocks noChangeAspect="1"/>
+            </p:cNvPicPr>
+            <p:nvPr/>
+          </p:nvPicPr>
+          <p:blipFill>
+            <a:blip r:embed="rId2"/>
+            <a:stretch>
+              <a:fillRect/>
+            </a:stretch>
+          </p:blipFill>
+          <p:spPr>
+            <a:xfrm>
+              <a:off x="5334000" y="1219200"/>
+              <a:ext cx="2761606" cy="2362200"/>
+            </a:xfrm>
+            <a:prstGeom prst="rect">
+              <a:avLst/>
+            </a:prstGeom>
+          </p:spPr>
+        </p:pic>
+        <p:sp>
+          <p:nvSpPr>
+            <p:cNvPr id="10" name="TextBox 9">
+              <a:extLst>
+                <a:ext uri="{FF2B5EF4-FFF2-40B4-BE49-F238E27FC236}">
+                  <a16:creationId xmlns:a16="http://schemas.microsoft.com/office/drawing/2014/main" id="{C294F186-587E-5140-A35A-E0142D03A0E1}"/>
+                </a:ext>
+              </a:extLst>
+            </p:cNvPr>
+            <p:cNvSpPr txBox="1"/>
+            <p:nvPr/>
+          </p:nvSpPr>
+          <p:spPr>
+            <a:xfrm>
+              <a:off x="5562600" y="791499"/>
+              <a:ext cx="2003112" cy="430887"/>
+            </a:xfrm>
+            <a:prstGeom prst="rect">
+              <a:avLst/>
+            </a:prstGeom>
+            <a:noFill/>
+          </p:spPr>
+          <p:txBody>
+            <a:bodyPr wrap="none" rtlCol="0">
+              <a:spAutoFit/>
+            </a:bodyPr>
+            <a:lstStyle/>
+            <a:p>
+              <a:r>
+                <a:rPr lang="en-US" sz="1500" dirty="0"/>
+                <a:t>Functional Bias</a:t>
+              </a:r>
+            </a:p>
+          </p:txBody>
+        </p:sp>
+      </p:grpSp>
+      <p:grpSp>
+        <p:nvGrpSpPr>
+          <p:cNvPr id="16" name="Group 15">
+            <a:extLst>
+              <a:ext uri="{FF2B5EF4-FFF2-40B4-BE49-F238E27FC236}">
+                <a16:creationId xmlns:a16="http://schemas.microsoft.com/office/drawing/2014/main" id="{EDC4810E-683A-0C4C-8B89-DA843C76169F}"/>
+              </a:ext>
+            </a:extLst>
+          </p:cNvPr>
+          <p:cNvGrpSpPr/>
+          <p:nvPr/>
+        </p:nvGrpSpPr>
+        <p:grpSpPr>
+          <a:xfrm>
+            <a:off x="1799045" y="1485900"/>
+            <a:ext cx="2585807" cy="2352675"/>
+            <a:chOff x="2876550" y="3703983"/>
+            <a:chExt cx="3447743" cy="3136900"/>
+          </a:xfrm>
+        </p:grpSpPr>
+        <p:pic>
+          <p:nvPicPr>
+            <p:cNvPr id="13" name="Picture 12">
+              <a:extLst>
+                <a:ext uri="{FF2B5EF4-FFF2-40B4-BE49-F238E27FC236}">
+                  <a16:creationId xmlns:a16="http://schemas.microsoft.com/office/drawing/2014/main" id="{3C30F030-9E6C-8F43-AEF9-08E7B4FB2333}"/>
+                </a:ext>
+              </a:extLst>
+            </p:cNvPr>
+            <p:cNvPicPr>
+              <a:picLocks noChangeAspect="1"/>
+            </p:cNvPicPr>
+            <p:nvPr/>
+          </p:nvPicPr>
+          <p:blipFill>
+            <a:blip r:embed="rId3"/>
+            <a:stretch>
+              <a:fillRect/>
+            </a:stretch>
+          </p:blipFill>
+          <p:spPr>
+            <a:xfrm>
+              <a:off x="2876550" y="3703983"/>
+              <a:ext cx="3390900" cy="3136900"/>
+            </a:xfrm>
+            <a:prstGeom prst="rect">
+              <a:avLst/>
+            </a:prstGeom>
+          </p:spPr>
+        </p:pic>
+        <p:sp>
+          <p:nvSpPr>
+            <p:cNvPr id="14" name="TextBox 13">
+              <a:extLst>
+                <a:ext uri="{FF2B5EF4-FFF2-40B4-BE49-F238E27FC236}">
+                  <a16:creationId xmlns:a16="http://schemas.microsoft.com/office/drawing/2014/main" id="{2B4F95A9-E797-574B-8241-5DDA4647FB38}"/>
+                </a:ext>
+              </a:extLst>
+            </p:cNvPr>
+            <p:cNvSpPr txBox="1"/>
+            <p:nvPr/>
+          </p:nvSpPr>
+          <p:spPr>
+            <a:xfrm>
+              <a:off x="4592622" y="3703983"/>
+              <a:ext cx="1731671" cy="430887"/>
+            </a:xfrm>
+            <a:prstGeom prst="rect">
+              <a:avLst/>
+            </a:prstGeom>
+            <a:noFill/>
+          </p:spPr>
+          <p:txBody>
+            <a:bodyPr wrap="none" rtlCol="0">
+              <a:spAutoFit/>
+            </a:bodyPr>
+            <a:lstStyle/>
+            <a:p>
+              <a:r>
+                <a:rPr lang="en-US" sz="1500" dirty="0"/>
+                <a:t>Likely Outlier</a:t>
+              </a:r>
+            </a:p>
+          </p:txBody>
+        </p:sp>
+      </p:grpSp>
+      <p:grpSp>
+        <p:nvGrpSpPr>
+          <p:cNvPr id="15" name="Group 14">
+            <a:extLst>
+              <a:ext uri="{FF2B5EF4-FFF2-40B4-BE49-F238E27FC236}">
+                <a16:creationId xmlns:a16="http://schemas.microsoft.com/office/drawing/2014/main" id="{53A85C2E-618D-AF4E-9FF0-752109F588F1}"/>
+              </a:ext>
+            </a:extLst>
+          </p:cNvPr>
+          <p:cNvGrpSpPr/>
+          <p:nvPr/>
+        </p:nvGrpSpPr>
+        <p:grpSpPr>
+          <a:xfrm>
+            <a:off x="1543050" y="3971013"/>
+            <a:ext cx="2857500" cy="1771579"/>
+            <a:chOff x="457200" y="1096299"/>
+            <a:chExt cx="3810000" cy="2362105"/>
+          </a:xfrm>
+          <a:solidFill>
+            <a:schemeClr val="bg1"/>
+          </a:solidFill>
+        </p:grpSpPr>
+        <p:pic>
+          <p:nvPicPr>
+            <p:cNvPr id="5" name="Picture 4">
+              <a:extLst>
+                <a:ext uri="{FF2B5EF4-FFF2-40B4-BE49-F238E27FC236}">
+                  <a16:creationId xmlns:a16="http://schemas.microsoft.com/office/drawing/2014/main" id="{43A6F7B3-8448-FA46-A70F-0013357393A1}"/>
+                </a:ext>
+              </a:extLst>
+            </p:cNvPr>
+            <p:cNvPicPr>
+              <a:picLocks noChangeAspect="1"/>
+            </p:cNvPicPr>
+            <p:nvPr/>
+          </p:nvPicPr>
+          <p:blipFill>
+            <a:blip r:embed="rId4"/>
+            <a:stretch>
+              <a:fillRect/>
+            </a:stretch>
+          </p:blipFill>
+          <p:spPr>
+            <a:xfrm>
+              <a:off x="914400" y="1267749"/>
+              <a:ext cx="3270250" cy="2152650"/>
+            </a:xfrm>
+            <a:prstGeom prst="rect">
+              <a:avLst/>
+            </a:prstGeom>
+            <a:grpFill/>
+          </p:spPr>
+        </p:pic>
+        <p:sp>
+          <p:nvSpPr>
+            <p:cNvPr id="6" name="Rectangle 5">
+              <a:extLst>
+                <a:ext uri="{FF2B5EF4-FFF2-40B4-BE49-F238E27FC236}">
+                  <a16:creationId xmlns:a16="http://schemas.microsoft.com/office/drawing/2014/main" id="{7D575970-1478-014D-99B7-3351955BDAF1}"/>
+                </a:ext>
+              </a:extLst>
+            </p:cNvPr>
+            <p:cNvSpPr/>
+            <p:nvPr/>
+          </p:nvSpPr>
+          <p:spPr>
+            <a:xfrm>
+              <a:off x="457200" y="1229743"/>
+              <a:ext cx="685800" cy="2228661"/>
+            </a:xfrm>
+            <a:prstGeom prst="rect">
+              <a:avLst/>
+            </a:prstGeom>
+            <a:grpFill/>
+            <a:ln>
+              <a:solidFill>
+                <a:schemeClr val="bg1"/>
+              </a:solidFill>
+            </a:ln>
+            <a:effectLst>
+              <a:outerShdw dist="23000" sx="1000" sy="1000" rotWithShape="0">
+                <a:srgbClr val="000000"/>
+              </a:outerShdw>
+            </a:effectLst>
+          </p:spPr>
+          <p:style>
+            <a:lnRef idx="1">
+              <a:schemeClr val="accent1"/>
+            </a:lnRef>
+            <a:fillRef idx="3">
+              <a:schemeClr val="accent1"/>
+            </a:fillRef>
+            <a:effectRef idx="2">
+              <a:schemeClr val="accent1"/>
+            </a:effectRef>
+            <a:fontRef idx="minor">
+              <a:schemeClr val="lt1"/>
+            </a:fontRef>
+          </p:style>
+          <p:txBody>
+            <a:bodyPr rtlCol="0" anchor="ctr"/>
+            <a:lstStyle/>
+            <a:p>
+              <a:pPr algn="ctr"/>
+              <a:endParaRPr lang="en-US"/>
+            </a:p>
+          </p:txBody>
+        </p:sp>
+        <p:sp>
+          <p:nvSpPr>
+            <p:cNvPr id="7" name="Rectangle 6">
+              <a:extLst>
+                <a:ext uri="{FF2B5EF4-FFF2-40B4-BE49-F238E27FC236}">
+                  <a16:creationId xmlns:a16="http://schemas.microsoft.com/office/drawing/2014/main" id="{7A3F0F30-4157-2C43-A7B7-4EFCFFC4DE98}"/>
+                </a:ext>
+              </a:extLst>
+            </p:cNvPr>
+            <p:cNvSpPr/>
+            <p:nvPr/>
+          </p:nvSpPr>
+          <p:spPr>
+            <a:xfrm>
+              <a:off x="571500" y="1096299"/>
+              <a:ext cx="3695700" cy="245803"/>
+            </a:xfrm>
+            <a:prstGeom prst="rect">
+              <a:avLst/>
+            </a:prstGeom>
+            <a:grpFill/>
+            <a:ln>
+              <a:solidFill>
+                <a:schemeClr val="bg1"/>
+              </a:solidFill>
+            </a:ln>
+            <a:effectLst>
+              <a:outerShdw dist="23000" sx="1000" sy="1000" rotWithShape="0">
+                <a:srgbClr val="000000"/>
+              </a:outerShdw>
+            </a:effectLst>
+          </p:spPr>
+          <p:style>
+            <a:lnRef idx="1">
+              <a:schemeClr val="accent1"/>
+            </a:lnRef>
+            <a:fillRef idx="3">
+              <a:schemeClr val="accent1"/>
+            </a:fillRef>
+            <a:effectRef idx="2">
+              <a:schemeClr val="accent1"/>
+            </a:effectRef>
+            <a:fontRef idx="minor">
+              <a:schemeClr val="lt1"/>
+            </a:fontRef>
+          </p:style>
+          <p:txBody>
+            <a:bodyPr rtlCol="0" anchor="ctr"/>
+            <a:lstStyle/>
+            <a:p>
+              <a:pPr algn="ctr"/>
+              <a:endParaRPr lang="en-US"/>
+            </a:p>
+          </p:txBody>
+        </p:sp>
+        <p:sp>
+          <p:nvSpPr>
+            <p:cNvPr id="11" name="TextBox 10">
+              <a:extLst>
+                <a:ext uri="{FF2B5EF4-FFF2-40B4-BE49-F238E27FC236}">
+                  <a16:creationId xmlns:a16="http://schemas.microsoft.com/office/drawing/2014/main" id="{168ED7C9-949E-4641-BB61-7C0673B533E5}"/>
+                </a:ext>
+              </a:extLst>
+            </p:cNvPr>
+            <p:cNvSpPr txBox="1"/>
+            <p:nvPr/>
+          </p:nvSpPr>
+          <p:spPr>
+            <a:xfrm>
+              <a:off x="1524000" y="1153390"/>
+              <a:ext cx="2488289" cy="430887"/>
+            </a:xfrm>
+            <a:prstGeom prst="rect">
+              <a:avLst/>
+            </a:prstGeom>
+            <a:grpFill/>
+          </p:spPr>
+          <p:txBody>
+            <a:bodyPr wrap="none" rtlCol="0">
+              <a:spAutoFit/>
+            </a:bodyPr>
+            <a:lstStyle/>
+            <a:p>
+              <a:r>
+                <a:rPr lang="en-US" sz="1500" dirty="0" err="1"/>
+                <a:t>Heteroschodasticity</a:t>
+              </a:r>
+              <a:endParaRPr lang="en-US" sz="1500" dirty="0"/>
+            </a:p>
+          </p:txBody>
+        </p:sp>
+      </p:grpSp>
+    </p:spTree>
+    <p:extLst>
+      <p:ext uri="{BB962C8B-B14F-4D97-AF65-F5344CB8AC3E}">
+        <p14:creationId xmlns:p14="http://schemas.microsoft.com/office/powerpoint/2010/main" val="3795647050"/>
+      </p:ext>
+    </p:extLst>
+  </p:cSld>
+  <p:clrMapOvr>
+    <a:masterClrMapping/>
+  </p:clrMapOvr>
+  <p:timing>
+    <p:tnLst>
+      <p:par>
+        <p:cTn id="1" dur="indefinite" restart="never" nodeType="tmRoot">
+          <p:childTnLst>
+            <p:seq concurrent="1" nextAc="seek">
+              <p:cTn id="2" dur="indefinite" nodeType="mainSeq">
+                <p:childTnLst>
+                  <p:par>
+                    <p:cTn id="3" fill="hold">
+                      <p:stCondLst>
+                        <p:cond delay="indefinite"/>
+                      </p:stCondLst>
+                      <p:childTnLst>
+                        <p:par>
+                          <p:cTn id="4" fill="hold">
+                            <p:stCondLst>
+                              <p:cond delay="0"/>
+                            </p:stCondLst>
+                            <p:childTnLst>
+                              <p:par>
+                                <p:cTn id="5" presetID="1" presetClass="entr" presetSubtype="0" fill="hold" nodeType="clickEffect">
+                                  <p:stCondLst>
+                                    <p:cond delay="0"/>
+                                  </p:stCondLst>
+                                  <p:childTnLst>
+                                    <p:set>
+                                      <p:cBhvr>
+                                        <p:cTn id="6" dur="1" fill="hold">
+                                          <p:stCondLst>
+                                            <p:cond delay="0"/>
+                                          </p:stCondLst>
+                                        </p:cTn>
+                                        <p:tgtEl>
+                                          <p:spTgt spid="16"/>
+                                        </p:tgtEl>
+                                        <p:attrNameLst>
+                                          <p:attrName>style.visibility</p:attrName>
+                                        </p:attrNameLst>
+                                      </p:cBhvr>
+                                      <p:to>
+                                        <p:strVal val="visible"/>
+                                      </p:to>
+                                    </p:set>
+                                  </p:childTnLst>
+                                </p:cTn>
+                              </p:par>
+                            </p:childTnLst>
+                          </p:cTn>
+                        </p:par>
+                      </p:childTnLst>
+                    </p:cTn>
+                  </p:par>
+                  <p:par>
+                    <p:cTn id="7" fill="hold">
+                      <p:stCondLst>
+                        <p:cond delay="indefinite"/>
+                      </p:stCondLst>
+                      <p:childTnLst>
+                        <p:par>
+                          <p:cTn id="8" fill="hold">
+                            <p:stCondLst>
+                              <p:cond delay="0"/>
+                            </p:stCondLst>
+                            <p:childTnLst>
+                              <p:par>
+                                <p:cTn id="9" presetID="1" presetClass="entr" presetSubtype="0" fill="hold" nodeType="clickEffect">
+                                  <p:stCondLst>
+                                    <p:cond delay="0"/>
+                                  </p:stCondLst>
+                                  <p:childTnLst>
+                                    <p:set>
+                                      <p:cBhvr>
+                                        <p:cTn id="10" dur="1" fill="hold">
+                                          <p:stCondLst>
+                                            <p:cond delay="0"/>
+                                          </p:stCondLst>
+                                        </p:cTn>
+                                        <p:tgtEl>
+                                          <p:spTgt spid="17"/>
+                                        </p:tgtEl>
+                                        <p:attrNameLst>
+                                          <p:attrName>style.visibility</p:attrName>
+                                        </p:attrNameLst>
+                                      </p:cBhvr>
+                                      <p:to>
+                                        <p:strVal val="visible"/>
+                                      </p:to>
+                                    </p:set>
+                                  </p:childTnLst>
+                                </p:cTn>
+                              </p:par>
+                            </p:childTnLst>
+                          </p:cTn>
+                        </p:par>
+                      </p:childTnLst>
+                    </p:cTn>
+                  </p:par>
+                  <p:par>
+                    <p:cTn id="11" fill="hold">
+                      <p:stCondLst>
+                        <p:cond delay="indefinite"/>
+                      </p:stCondLst>
+                      <p:childTnLst>
+                        <p:par>
+                          <p:cTn id="12" fill="hold">
+                            <p:stCondLst>
+                              <p:cond delay="0"/>
+                            </p:stCondLst>
+                            <p:childTnLst>
+                              <p:par>
+                                <p:cTn id="13" presetID="1" presetClass="entr" presetSubtype="0" fill="hold" nodeType="clickEffect">
+                                  <p:stCondLst>
+                                    <p:cond delay="0"/>
+                                  </p:stCondLst>
+                                  <p:childTnLst>
+                                    <p:set>
+                                      <p:cBhvr>
+                                        <p:cTn id="14" dur="1" fill="hold">
+                                          <p:stCondLst>
+                                            <p:cond delay="0"/>
+                                          </p:stCondLst>
+                                        </p:cTn>
+                                        <p:tgtEl>
+                                          <p:spTgt spid="15"/>
+                                        </p:tgtEl>
+                                        <p:attrNameLst>
+                                          <p:attrName>style.visibility</p:attrName>
+                                        </p:attrNameLst>
+                                      </p:cBhvr>
+                                      <p:to>
+                                        <p:strVal val="visible"/>
+                                      </p:to>
+                                    </p:set>
+                                  </p:childTnLst>
+                                </p:cTn>
+                              </p:par>
+                            </p:childTnLst>
+                          </p:cTn>
+                        </p:par>
+                      </p:childTnLst>
+                    </p:cTn>
+                  </p:par>
+                </p:childTnLst>
+              </p:cTn>
+              <p:prevCondLst>
+                <p:cond evt="onPrev" delay="0">
+                  <p:tgtEl>
+                    <p:sldTgt/>
+                  </p:tgtEl>
+                </p:cond>
+              </p:prevCondLst>
+              <p:nextCondLst>
+                <p:cond evt="onNext" delay="0">
+                  <p:tgtEl>
+                    <p:sldTgt/>
+                  </p:tgtEl>
+                </p:cond>
+              </p:nextCondLst>
+            </p:seq>
+          </p:childTnLst>
+        </p:cTn>
+      </p:par>
+    </p:tnLst>
+  </p:timing>
+</p:sld>
+</file>
+
+<file path=ppt/slides/slide11.xml><?xml version="1.0" encoding="utf-8"?>
+<p:sld xmlns:a="http://schemas.openxmlformats.org/drawingml/2006/main" xmlns:r="http://schemas.openxmlformats.org/officeDocument/2006/relationships" xmlns:p="http://schemas.openxmlformats.org/presentationml/2006/main">
+  <p:cSld>
+    <p:spTree>
+      <p:nvGrpSpPr>
+        <p:cNvPr id="1" name=""/>
+        <p:cNvGrpSpPr/>
+        <p:nvPr/>
+      </p:nvGrpSpPr>
+      <p:grpSpPr>
+        <a:xfrm>
+          <a:off x="0" y="0"/>
+          <a:ext cx="0" cy="0"/>
+          <a:chOff x="0" y="0"/>
+          <a:chExt cx="0" cy="0"/>
+        </a:xfrm>
+      </p:grpSpPr>
+      <p:sp>
+        <p:nvSpPr>
+          <p:cNvPr id="2" name="Title 1"/>
+          <p:cNvSpPr>
+            <a:spLocks noGrp="1"/>
+          </p:cNvSpPr>
+          <p:nvPr>
+            <p:ph type="title"/>
+          </p:nvPr>
+        </p:nvSpPr>
+        <p:spPr/>
+        <p:txBody>
+          <a:bodyPr/>
+          <a:lstStyle/>
+          <a:p>
+            <a:r>
+              <a:rPr lang="en-US" dirty="0"/>
+              <a:t>Calculating Residuals</a:t>
+            </a:r>
+          </a:p>
+        </p:txBody>
+      </p:sp>
+      <mc:AlternateContent xmlns:mc="http://schemas.openxmlformats.org/markup-compatibility/2006" xmlns:a14="http://schemas.microsoft.com/office/drawing/2010/main">
+        <mc:Choice Requires="a14">
+          <p:sp>
+            <p:nvSpPr>
+              <p:cNvPr id="3" name="Content Placeholder 2"/>
+              <p:cNvSpPr>
+                <a:spLocks noGrp="1"/>
+              </p:cNvSpPr>
+              <p:nvPr>
+                <p:ph idx="1"/>
+              </p:nvPr>
+            </p:nvSpPr>
+            <p:spPr/>
+            <p:txBody>
+              <a:bodyPr/>
+              <a:lstStyle/>
+              <a:p>
+                <a:r>
+                  <a:rPr lang="en-US" dirty="0"/>
+                  <a:t>The fitting procedure will attempt to minimize the difference between the model </a:t>
+                </a:r>
+                <a14:m>
+                  <m:oMath xmlns:m="http://schemas.openxmlformats.org/officeDocument/2006/math">
+                    <m:r>
+                      <a:rPr lang="en-US" b="0" i="1" smtClean="0">
+                        <a:latin typeface="Cambria Math" panose="02040503050406030204" pitchFamily="18" charset="0"/>
+                      </a:rPr>
+                      <m:t>𝑓</m:t>
+                    </m:r>
+                  </m:oMath>
+                </a14:m>
+                <a:r>
+                  <a:rPr lang="en-US" dirty="0"/>
+                  <a:t>and the data points </a:t>
+                </a:r>
+                <a14:m>
+                  <m:oMath xmlns:m="http://schemas.openxmlformats.org/officeDocument/2006/math">
+                    <m:sSub>
+                      <m:sSubPr>
+                        <m:ctrlPr>
+                          <a:rPr lang="en-US" b="0" i="1" smtClean="0">
+                            <a:latin typeface="Cambria Math" panose="02040503050406030204" pitchFamily="18" charset="0"/>
+                          </a:rPr>
+                        </m:ctrlPr>
+                      </m:sSubPr>
+                      <m:e>
+                        <m:r>
+                          <a:rPr lang="en-US" b="0" i="1" smtClean="0">
+                            <a:latin typeface="Cambria Math" panose="02040503050406030204" pitchFamily="18" charset="0"/>
+                          </a:rPr>
+                          <m:t>𝑦</m:t>
+                        </m:r>
+                      </m:e>
+                      <m:sub>
+                        <m:r>
+                          <a:rPr lang="en-US" b="0" i="1" smtClean="0">
+                            <a:latin typeface="Cambria Math" panose="02040503050406030204" pitchFamily="18" charset="0"/>
+                          </a:rPr>
+                          <m:t>𝑖</m:t>
+                        </m:r>
+                      </m:sub>
+                    </m:sSub>
+                  </m:oMath>
+                </a14:m>
+                <a:r>
+                  <a:rPr lang="en-US" dirty="0"/>
+                  <a:t>, that is minimize:</a:t>
+                </a:r>
+              </a:p>
+              <a:p>
+                <a:pPr marL="0" indent="0">
+                  <a:buNone/>
+                </a:pPr>
+                <a:endParaRPr lang="en-US" dirty="0"/>
+              </a:p>
+              <a:p>
+                <a:pPr marL="0" indent="0">
+                  <a:buNone/>
+                </a:pPr>
+                <a14:m>
+                  <m:oMathPara xmlns:m="http://schemas.openxmlformats.org/officeDocument/2006/math">
+                    <m:oMathParaPr>
+                      <m:jc m:val="centerGroup"/>
+                    </m:oMathParaPr>
+                    <m:oMath xmlns:m="http://schemas.openxmlformats.org/officeDocument/2006/math">
+                      <m:sSub>
+                        <m:sSubPr>
+                          <m:ctrlPr>
+                            <a:rPr lang="en-US" b="0" i="1" smtClean="0">
+                              <a:latin typeface="Cambria Math" panose="02040503050406030204" pitchFamily="18" charset="0"/>
+                            </a:rPr>
+                          </m:ctrlPr>
+                        </m:sSubPr>
+                        <m:e>
+                          <m:r>
+                            <a:rPr lang="en-US" b="0" i="1" smtClean="0">
+                              <a:latin typeface="Cambria Math" panose="02040503050406030204" pitchFamily="18" charset="0"/>
+                            </a:rPr>
+                            <m:t>𝑦</m:t>
+                          </m:r>
+                        </m:e>
+                        <m:sub>
+                          <m:r>
+                            <a:rPr lang="en-US" b="0" i="1" smtClean="0">
+                              <a:latin typeface="Cambria Math" panose="02040503050406030204" pitchFamily="18" charset="0"/>
+                            </a:rPr>
+                            <m:t>𝑖</m:t>
+                          </m:r>
+                        </m:sub>
+                      </m:sSub>
+                      <m:r>
+                        <a:rPr lang="en-US" b="0" i="1" smtClean="0">
+                          <a:latin typeface="Cambria Math" panose="02040503050406030204" pitchFamily="18" charset="0"/>
+                        </a:rPr>
+                        <m:t>−</m:t>
+                      </m:r>
+                      <m:r>
+                        <a:rPr lang="en-US" b="0" i="1" smtClean="0">
+                          <a:latin typeface="Cambria Math" panose="02040503050406030204" pitchFamily="18" charset="0"/>
+                        </a:rPr>
+                        <m:t>𝑓</m:t>
+                      </m:r>
+                      <m:r>
+                        <a:rPr lang="en-US" b="0" i="1" smtClean="0">
+                          <a:latin typeface="Cambria Math" panose="02040503050406030204" pitchFamily="18" charset="0"/>
+                        </a:rPr>
+                        <m:t>(</m:t>
+                      </m:r>
+                      <m:sSub>
+                        <m:sSubPr>
+                          <m:ctrlPr>
+                            <a:rPr lang="en-US" b="0" i="1" smtClean="0">
+                              <a:latin typeface="Cambria Math" panose="02040503050406030204" pitchFamily="18" charset="0"/>
+                            </a:rPr>
+                          </m:ctrlPr>
+                        </m:sSubPr>
+                        <m:e>
+                          <m:r>
+                            <a:rPr lang="en-US" b="0" i="1" smtClean="0">
+                              <a:latin typeface="Cambria Math" panose="02040503050406030204" pitchFamily="18" charset="0"/>
+                            </a:rPr>
+                            <m:t>𝑥</m:t>
+                          </m:r>
+                        </m:e>
+                        <m:sub>
+                          <m:r>
+                            <a:rPr lang="en-US" b="0" i="1" smtClean="0">
+                              <a:latin typeface="Cambria Math" panose="02040503050406030204" pitchFamily="18" charset="0"/>
+                            </a:rPr>
+                            <m:t>𝑖</m:t>
+                          </m:r>
+                        </m:sub>
+                      </m:sSub>
+                      <m:r>
+                        <a:rPr lang="en-US" b="0" i="1" smtClean="0">
+                          <a:latin typeface="Cambria Math" panose="02040503050406030204" pitchFamily="18" charset="0"/>
+                        </a:rPr>
+                        <m:t>;</m:t>
+                      </m:r>
+                      <m:sSub>
+                        <m:sSubPr>
+                          <m:ctrlPr>
+                            <a:rPr lang="en-US" b="0" i="1" smtClean="0">
+                              <a:latin typeface="Cambria Math" panose="02040503050406030204" pitchFamily="18" charset="0"/>
+                            </a:rPr>
+                          </m:ctrlPr>
+                        </m:sSubPr>
+                        <m:e>
+                          <m:r>
+                            <a:rPr lang="en-US" b="0" i="1" smtClean="0">
+                              <a:latin typeface="Cambria Math" panose="02040503050406030204" pitchFamily="18" charset="0"/>
+                            </a:rPr>
+                            <m:t>𝑝</m:t>
+                          </m:r>
+                        </m:e>
+                        <m:sub>
+                          <m:r>
+                            <a:rPr lang="en-US" b="0" i="1" smtClean="0">
+                              <a:latin typeface="Cambria Math" panose="02040503050406030204" pitchFamily="18" charset="0"/>
+                            </a:rPr>
+                            <m:t>1</m:t>
+                          </m:r>
+                        </m:sub>
+                      </m:sSub>
+                      <m:r>
+                        <a:rPr lang="en-US" b="0" i="1" smtClean="0">
+                          <a:latin typeface="Cambria Math" panose="02040503050406030204" pitchFamily="18" charset="0"/>
+                        </a:rPr>
+                        <m:t>…</m:t>
+                      </m:r>
+                      <m:sSub>
+                        <m:sSubPr>
+                          <m:ctrlPr>
+                            <a:rPr lang="en-US" b="0" i="1" smtClean="0">
+                              <a:latin typeface="Cambria Math" panose="02040503050406030204" pitchFamily="18" charset="0"/>
+                            </a:rPr>
+                          </m:ctrlPr>
+                        </m:sSubPr>
+                        <m:e>
+                          <m:r>
+                            <a:rPr lang="en-US" b="0" i="1" smtClean="0">
+                              <a:latin typeface="Cambria Math" panose="02040503050406030204" pitchFamily="18" charset="0"/>
+                            </a:rPr>
+                            <m:t>𝑝</m:t>
+                          </m:r>
+                        </m:e>
+                        <m:sub>
+                          <m:r>
+                            <a:rPr lang="en-US" b="0" i="1" smtClean="0">
+                              <a:latin typeface="Cambria Math" panose="02040503050406030204" pitchFamily="18" charset="0"/>
+                            </a:rPr>
+                            <m:t>𝑚</m:t>
+                          </m:r>
+                        </m:sub>
+                      </m:sSub>
+                      <m:r>
+                        <a:rPr lang="en-US" b="0" i="1" smtClean="0">
+                          <a:latin typeface="Cambria Math" panose="02040503050406030204" pitchFamily="18" charset="0"/>
+                        </a:rPr>
+                        <m:t>)</m:t>
+                      </m:r>
+                    </m:oMath>
+                  </m:oMathPara>
+                </a14:m>
+                <a:endParaRPr lang="en-US" dirty="0"/>
+              </a:p>
+              <a:p>
+                <a:pPr marL="0" indent="0">
+                  <a:buNone/>
+                </a:pPr>
+                <a:endParaRPr lang="en-US" dirty="0"/>
+              </a:p>
+            </p:txBody>
+          </p:sp>
+        </mc:Choice>
+        <mc:Fallback xmlns="">
+          <p:sp>
+            <p:nvSpPr>
+              <p:cNvPr id="3" name="Content Placeholder 2"/>
+              <p:cNvSpPr>
+                <a:spLocks noGrp="1" noRot="1" noChangeAspect="1" noMove="1" noResize="1" noEditPoints="1" noAdjustHandles="1" noChangeArrowheads="1" noChangeShapeType="1" noTextEdit="1"/>
+              </p:cNvSpPr>
+              <p:nvPr>
+                <p:ph idx="1"/>
+              </p:nvPr>
+            </p:nvSpPr>
+            <p:spPr>
+              <a:blipFill>
+                <a:blip r:embed="rId2"/>
+                <a:stretch>
+                  <a:fillRect l="-1389" t="-1662"/>
+                </a:stretch>
+              </a:blipFill>
+            </p:spPr>
+            <p:txBody>
+              <a:bodyPr/>
+              <a:lstStyle/>
+              <a:p>
+                <a:r>
+                  <a:rPr lang="en-US">
+                    <a:noFill/>
+                  </a:rPr>
+                  <a:t> </a:t>
+                </a:r>
+              </a:p>
+            </p:txBody>
+          </p:sp>
+        </mc:Fallback>
+      </mc:AlternateContent>
+    </p:spTree>
+    <p:extLst>
+      <p:ext uri="{BB962C8B-B14F-4D97-AF65-F5344CB8AC3E}">
+        <p14:creationId xmlns:p14="http://schemas.microsoft.com/office/powerpoint/2010/main" val="3850330752"/>
+      </p:ext>
+    </p:extLst>
+  </p:cSld>
+  <p:clrMapOvr>
+    <a:masterClrMapping/>
+  </p:clrMapOvr>
+</p:sld>
+</file>
+
+<file path=ppt/slides/slide12.xml><?xml version="1.0" encoding="utf-8"?>
+<p:sld xmlns:a="http://schemas.openxmlformats.org/drawingml/2006/main" xmlns:r="http://schemas.openxmlformats.org/officeDocument/2006/relationships" xmlns:p="http://schemas.openxmlformats.org/presentationml/2006/main">
+  <p:cSld>
+    <p:spTree>
+      <p:nvGrpSpPr>
+        <p:cNvPr id="1" name=""/>
+        <p:cNvGrpSpPr/>
+        <p:nvPr/>
+      </p:nvGrpSpPr>
+      <p:grpSpPr>
+        <a:xfrm>
+          <a:off x="0" y="0"/>
+          <a:ext cx="0" cy="0"/>
+          <a:chOff x="0" y="0"/>
+          <a:chExt cx="0" cy="0"/>
+        </a:xfrm>
+      </p:grpSpPr>
+      <p:sp>
+        <p:nvSpPr>
           <p:cNvPr id="2" name="Title 1"/>
           <p:cNvSpPr>
             <a:spLocks noGrp="1"/>
@@ -5321,8 +6273,8 @@
           </a:p>
         </p:txBody>
       </p:sp>
-      <mc:AlternateContent xmlns:mc="http://schemas.openxmlformats.org/markup-compatibility/2006">
-        <mc:Choice xmlns:a14="http://schemas.microsoft.com/office/drawing/2010/main" Requires="a14">
+      <mc:AlternateContent xmlns:mc="http://schemas.openxmlformats.org/markup-compatibility/2006" xmlns:a14="http://schemas.microsoft.com/office/drawing/2010/main">
+        <mc:Choice Requires="a14">
           <p:sp>
             <p:nvSpPr>
               <p:cNvPr id="3" name="Content Placeholder 2"/>
@@ -5547,7 +6499,7 @@
             </p:txBody>
           </p:sp>
         </mc:Choice>
-        <mc:Fallback>
+        <mc:Fallback xmlns="">
           <p:sp>
             <p:nvSpPr>
               <p:cNvPr id="3" name="Content Placeholder 2"/>
@@ -5641,7 +6593,7 @@
 </p:sld>
 </file>
 
-<file path=ppt/slides/slide11.xml><?xml version="1.0" encoding="utf-8"?>
+<file path=ppt/slides/slide13.xml><?xml version="1.0" encoding="utf-8"?>
 <p:sld xmlns:a="http://schemas.openxmlformats.org/drawingml/2006/main" xmlns:r="http://schemas.openxmlformats.org/officeDocument/2006/relationships" xmlns:p="http://schemas.openxmlformats.org/presentationml/2006/main">
   <p:cSld>
     <p:spTree>
@@ -5680,8 +6632,8 @@
           </a:p>
         </p:txBody>
       </p:sp>
-      <mc:AlternateContent xmlns:mc="http://schemas.openxmlformats.org/markup-compatibility/2006">
-        <mc:Choice xmlns:a14="http://schemas.microsoft.com/office/drawing/2010/main" Requires="a14">
+      <mc:AlternateContent xmlns:mc="http://schemas.openxmlformats.org/markup-compatibility/2006" xmlns:a14="http://schemas.microsoft.com/office/drawing/2010/main">
+        <mc:Choice Requires="a14">
           <p:sp>
             <p:nvSpPr>
               <p:cNvPr id="3" name="Content Placeholder 2"/>
@@ -6088,7 +7040,7 @@
             </p:txBody>
           </p:sp>
         </mc:Choice>
-        <mc:Fallback>
+        <mc:Fallback xmlns="">
           <p:sp>
             <p:nvSpPr>
               <p:cNvPr id="3" name="Content Placeholder 2"/>
@@ -6135,7 +7087,7 @@
 </p:sld>
 </file>
 
-<file path=ppt/slides/slide12.xml><?xml version="1.0" encoding="utf-8"?>
+<file path=ppt/slides/slide14.xml><?xml version="1.0" encoding="utf-8"?>
 <p:sld xmlns:a="http://schemas.openxmlformats.org/drawingml/2006/main" xmlns:r="http://schemas.openxmlformats.org/officeDocument/2006/relationships" xmlns:p="http://schemas.openxmlformats.org/presentationml/2006/main">
   <p:cSld>
     <p:spTree>
@@ -6590,305 +7542,6 @@
 </p:sld>
 </file>
 
-<file path=ppt/slides/slide13.xml><?xml version="1.0" encoding="utf-8"?>
-<p:sld xmlns:a="http://schemas.openxmlformats.org/drawingml/2006/main" xmlns:r="http://schemas.openxmlformats.org/officeDocument/2006/relationships" xmlns:p="http://schemas.openxmlformats.org/presentationml/2006/main">
-  <p:cSld>
-    <p:spTree>
-      <p:nvGrpSpPr>
-        <p:cNvPr id="1" name=""/>
-        <p:cNvGrpSpPr/>
-        <p:nvPr/>
-      </p:nvGrpSpPr>
-      <p:grpSpPr>
-        <a:xfrm>
-          <a:off x="0" y="0"/>
-          <a:ext cx="0" cy="0"/>
-          <a:chOff x="0" y="0"/>
-          <a:chExt cx="0" cy="0"/>
-        </a:xfrm>
-      </p:grpSpPr>
-      <p:sp>
-        <p:nvSpPr>
-          <p:cNvPr id="2" name="Title 1"/>
-          <p:cNvSpPr>
-            <a:spLocks noGrp="1"/>
-          </p:cNvSpPr>
-          <p:nvPr>
-            <p:ph type="title"/>
-          </p:nvPr>
-        </p:nvSpPr>
-        <p:spPr/>
-        <p:txBody>
-          <a:bodyPr/>
-          <a:lstStyle/>
-          <a:p>
-            <a:r>
-              <a:rPr lang="en-US" dirty="0"/>
-              <a:t>Under fitting</a:t>
-            </a:r>
-          </a:p>
-        </p:txBody>
-      </p:sp>
-      <p:sp>
-        <p:nvSpPr>
-          <p:cNvPr id="16" name="TextBox 15"/>
-          <p:cNvSpPr txBox="1"/>
-          <p:nvPr/>
-        </p:nvSpPr>
-        <p:spPr>
-          <a:xfrm>
-            <a:off x="1242507" y="2376285"/>
-            <a:ext cx="1633781" cy="415498"/>
-          </a:xfrm>
-          <a:prstGeom prst="rect">
-            <a:avLst/>
-          </a:prstGeom>
-          <a:noFill/>
-        </p:spPr>
-        <p:txBody>
-          <a:bodyPr wrap="none" rtlCol="0">
-            <a:spAutoFit/>
-          </a:bodyPr>
-          <a:lstStyle/>
-          <a:p>
-            <a:r>
-              <a:rPr lang="en-US" sz="2100" dirty="0">
-                <a:solidFill>
-                  <a:srgbClr val="FF0000"/>
-                </a:solidFill>
-              </a:rPr>
-              <a:t>Under fitting</a:t>
-            </a:r>
-          </a:p>
-        </p:txBody>
-      </p:sp>
-      <p:pic>
-        <p:nvPicPr>
-          <p:cNvPr id="8" name="Picture 7"/>
-          <p:cNvPicPr>
-            <a:picLocks noChangeAspect="1"/>
-          </p:cNvPicPr>
-          <p:nvPr/>
-        </p:nvPicPr>
-        <p:blipFill>
-          <a:blip r:embed="rId2"/>
-          <a:stretch>
-            <a:fillRect/>
-          </a:stretch>
-        </p:blipFill>
-        <p:spPr>
-          <a:xfrm>
-            <a:off x="628650" y="3019719"/>
-            <a:ext cx="3429297" cy="2057579"/>
-          </a:xfrm>
-          <a:prstGeom prst="rect">
-            <a:avLst/>
-          </a:prstGeom>
-        </p:spPr>
-      </p:pic>
-      <p:pic>
-        <p:nvPicPr>
-          <p:cNvPr id="10" name="Picture 9"/>
-          <p:cNvPicPr>
-            <a:picLocks noChangeAspect="1"/>
-          </p:cNvPicPr>
-          <p:nvPr/>
-        </p:nvPicPr>
-        <p:blipFill>
-          <a:blip r:embed="rId3"/>
-          <a:stretch>
-            <a:fillRect/>
-          </a:stretch>
-        </p:blipFill>
-        <p:spPr>
-          <a:xfrm>
-            <a:off x="4664636" y="3019719"/>
-            <a:ext cx="3429297" cy="2057579"/>
-          </a:xfrm>
-          <a:prstGeom prst="rect">
-            <a:avLst/>
-          </a:prstGeom>
-        </p:spPr>
-      </p:pic>
-      <p:sp>
-        <p:nvSpPr>
-          <p:cNvPr id="12" name="TextBox 11"/>
-          <p:cNvSpPr txBox="1"/>
-          <p:nvPr/>
-        </p:nvSpPr>
-        <p:spPr>
-          <a:xfrm>
-            <a:off x="5520016" y="2376285"/>
-            <a:ext cx="1887055" cy="415498"/>
-          </a:xfrm>
-          <a:prstGeom prst="rect">
-            <a:avLst/>
-          </a:prstGeom>
-          <a:noFill/>
-        </p:spPr>
-        <p:txBody>
-          <a:bodyPr wrap="none" rtlCol="0">
-            <a:spAutoFit/>
-          </a:bodyPr>
-          <a:lstStyle/>
-          <a:p>
-            <a:r>
-              <a:rPr lang="en-US" sz="2100" dirty="0">
-                <a:solidFill>
-                  <a:srgbClr val="FF0000"/>
-                </a:solidFill>
-              </a:rPr>
-              <a:t>More Realistic</a:t>
-            </a:r>
-          </a:p>
-        </p:txBody>
-      </p:sp>
-    </p:spTree>
-    <p:extLst>
-      <p:ext uri="{BB962C8B-B14F-4D97-AF65-F5344CB8AC3E}">
-        <p14:creationId xmlns:p14="http://schemas.microsoft.com/office/powerpoint/2010/main" val="626356990"/>
-      </p:ext>
-    </p:extLst>
-  </p:cSld>
-  <p:clrMapOvr>
-    <a:masterClrMapping/>
-  </p:clrMapOvr>
-</p:sld>
-</file>
-
-<file path=ppt/slides/slide14.xml><?xml version="1.0" encoding="utf-8"?>
-<p:sld xmlns:a="http://schemas.openxmlformats.org/drawingml/2006/main" xmlns:r="http://schemas.openxmlformats.org/officeDocument/2006/relationships" xmlns:p="http://schemas.openxmlformats.org/presentationml/2006/main">
-  <p:cSld>
-    <p:spTree>
-      <p:nvGrpSpPr>
-        <p:cNvPr id="1" name=""/>
-        <p:cNvGrpSpPr/>
-        <p:nvPr/>
-      </p:nvGrpSpPr>
-      <p:grpSpPr>
-        <a:xfrm>
-          <a:off x="0" y="0"/>
-          <a:ext cx="0" cy="0"/>
-          <a:chOff x="0" y="0"/>
-          <a:chExt cx="0" cy="0"/>
-        </a:xfrm>
-      </p:grpSpPr>
-      <p:sp>
-        <p:nvSpPr>
-          <p:cNvPr id="2" name="Title 1"/>
-          <p:cNvSpPr>
-            <a:spLocks noGrp="1"/>
-          </p:cNvSpPr>
-          <p:nvPr>
-            <p:ph type="title"/>
-          </p:nvPr>
-        </p:nvSpPr>
-        <p:spPr/>
-        <p:txBody>
-          <a:bodyPr/>
-          <a:lstStyle/>
-          <a:p>
-            <a:r>
-              <a:rPr lang="en-US" dirty="0"/>
-              <a:t>You’ve probably seen this: Someone is a bit too enthusiastic with Excel</a:t>
-            </a:r>
-          </a:p>
-        </p:txBody>
-      </p:sp>
-      <p:sp>
-        <p:nvSpPr>
-          <p:cNvPr id="16" name="TextBox 15"/>
-          <p:cNvSpPr txBox="1"/>
-          <p:nvPr/>
-        </p:nvSpPr>
-        <p:spPr>
-          <a:xfrm>
-            <a:off x="3212712" y="2195469"/>
-            <a:ext cx="2287806" cy="646331"/>
-          </a:xfrm>
-          <a:prstGeom prst="rect">
-            <a:avLst/>
-          </a:prstGeom>
-          <a:noFill/>
-        </p:spPr>
-        <p:txBody>
-          <a:bodyPr wrap="none" rtlCol="0">
-            <a:spAutoFit/>
-          </a:bodyPr>
-          <a:lstStyle/>
-          <a:p>
-            <a:r>
-              <a:rPr lang="en-US" sz="3600" dirty="0">
-                <a:solidFill>
-                  <a:srgbClr val="FF0000"/>
-                </a:solidFill>
-              </a:rPr>
-              <a:t>Overfitting</a:t>
-            </a:r>
-          </a:p>
-        </p:txBody>
-      </p:sp>
-      <p:pic>
-        <p:nvPicPr>
-          <p:cNvPr id="3" name="Picture 2"/>
-          <p:cNvPicPr>
-            <a:picLocks noChangeAspect="1"/>
-          </p:cNvPicPr>
-          <p:nvPr/>
-        </p:nvPicPr>
-        <p:blipFill>
-          <a:blip r:embed="rId2"/>
-          <a:stretch>
-            <a:fillRect/>
-          </a:stretch>
-        </p:blipFill>
-        <p:spPr>
-          <a:xfrm>
-            <a:off x="424240" y="3119439"/>
-            <a:ext cx="3438442" cy="2066723"/>
-          </a:xfrm>
-          <a:prstGeom prst="rect">
-            <a:avLst/>
-          </a:prstGeom>
-        </p:spPr>
-      </p:pic>
-      <p:pic>
-        <p:nvPicPr>
-          <p:cNvPr id="4" name="Picture 3"/>
-          <p:cNvPicPr>
-            <a:picLocks noChangeAspect="1"/>
-          </p:cNvPicPr>
-          <p:nvPr/>
-        </p:nvPicPr>
-        <p:blipFill>
-          <a:blip r:embed="rId3"/>
-          <a:stretch>
-            <a:fillRect/>
-          </a:stretch>
-        </p:blipFill>
-        <p:spPr>
-          <a:xfrm>
-            <a:off x="4426085" y="3069579"/>
-            <a:ext cx="3438442" cy="2066723"/>
-          </a:xfrm>
-          <a:prstGeom prst="rect">
-            <a:avLst/>
-          </a:prstGeom>
-        </p:spPr>
-      </p:pic>
-    </p:spTree>
-    <p:extLst>
-      <p:ext uri="{BB962C8B-B14F-4D97-AF65-F5344CB8AC3E}">
-        <p14:creationId xmlns:p14="http://schemas.microsoft.com/office/powerpoint/2010/main" val="417111455"/>
-      </p:ext>
-    </p:extLst>
-  </p:cSld>
-  <p:clrMapOvr>
-    <a:masterClrMapping/>
-  </p:clrMapOvr>
-</p:sld>
-</file>
-
 <file path=ppt/slides/slide15.xml><?xml version="1.0" encoding="utf-8"?>
 <p:sld xmlns:a="http://schemas.openxmlformats.org/drawingml/2006/main" xmlns:r="http://schemas.openxmlformats.org/officeDocument/2006/relationships" xmlns:p="http://schemas.openxmlformats.org/presentationml/2006/main">
   <p:cSld>
@@ -7267,8 +7920,8 @@
           </p:txBody>
         </p:sp>
       </p:grpSp>
-      <mc:AlternateContent xmlns:mc="http://schemas.openxmlformats.org/markup-compatibility/2006">
-        <mc:Choice xmlns:a14="http://schemas.microsoft.com/office/drawing/2010/main" Requires="a14">
+      <mc:AlternateContent xmlns:mc="http://schemas.openxmlformats.org/markup-compatibility/2006" xmlns:a14="http://schemas.microsoft.com/office/drawing/2010/main">
+        <mc:Choice Requires="a14">
           <p:sp>
             <p:nvSpPr>
               <p:cNvPr id="17" name="TextBox 16">
@@ -7342,7 +7995,7 @@
             </p:txBody>
           </p:sp>
         </mc:Choice>
-        <mc:Fallback>
+        <mc:Fallback xmlns="">
           <p:sp>
             <p:nvSpPr>
               <p:cNvPr id="17" name="TextBox 16">
@@ -7387,8 +8040,8 @@
           </p:sp>
         </mc:Fallback>
       </mc:AlternateContent>
-      <mc:AlternateContent xmlns:mc="http://schemas.openxmlformats.org/markup-compatibility/2006">
-        <mc:Choice xmlns:a14="http://schemas.microsoft.com/office/drawing/2010/main" Requires="a14">
+      <mc:AlternateContent xmlns:mc="http://schemas.openxmlformats.org/markup-compatibility/2006" xmlns:a14="http://schemas.microsoft.com/office/drawing/2010/main">
+        <mc:Choice Requires="a14">
           <p:sp>
             <p:nvSpPr>
               <p:cNvPr id="18" name="TextBox 17">
@@ -7655,7 +8308,7 @@
             </p:txBody>
           </p:sp>
         </mc:Choice>
-        <mc:Fallback>
+        <mc:Fallback xmlns="">
           <p:sp>
             <p:nvSpPr>
               <p:cNvPr id="18" name="TextBox 17">
@@ -7964,7 +8617,7 @@
             <p:spPr>
               <a:xfrm>
                 <a:off x="457200" y="1142999"/>
-                <a:ext cx="8229600" cy="4572001"/>
+                <a:ext cx="8229600" cy="4980009"/>
               </a:xfrm>
             </p:spPr>
             <p:txBody>
@@ -7973,7 +8626,71 @@
               <a:p>
                 <a:r>
                   <a:rPr lang="en-US" dirty="0"/>
-                  <a:t>We want to estimate the transfer function</a:t>
+                  <a:t>We want estimates of </a:t>
+                </a:r>
+                <a14:m>
+                  <m:oMath xmlns:m="http://schemas.openxmlformats.org/officeDocument/2006/math">
+                    <m:sSub>
+                      <m:sSubPr>
+                        <m:ctrlPr>
+                          <a:rPr lang="en-US" b="0" i="1" smtClean="0">
+                            <a:latin typeface="Cambria Math" panose="02040503050406030204" pitchFamily="18" charset="0"/>
+                          </a:rPr>
+                        </m:ctrlPr>
+                      </m:sSubPr>
+                      <m:e>
+                        <m:r>
+                          <a:rPr lang="en-US" b="0" i="1" smtClean="0">
+                            <a:latin typeface="Cambria Math" panose="02040503050406030204" pitchFamily="18" charset="0"/>
+                          </a:rPr>
+                          <m:t>𝑎</m:t>
+                        </m:r>
+                      </m:e>
+                      <m:sub>
+                        <m:r>
+                          <a:rPr lang="en-US" b="0" i="1" smtClean="0">
+                            <a:latin typeface="Cambria Math" panose="02040503050406030204" pitchFamily="18" charset="0"/>
+                          </a:rPr>
+                          <m:t>𝑘</m:t>
+                        </m:r>
+                      </m:sub>
+                    </m:sSub>
+                    <m:r>
+                      <a:rPr lang="en-US" b="0" i="1" smtClean="0">
+                        <a:latin typeface="Cambria Math" panose="02040503050406030204" pitchFamily="18" charset="0"/>
+                      </a:rPr>
+                      <m:t>,</m:t>
+                    </m:r>
+                    <m:sSub>
+                      <m:sSubPr>
+                        <m:ctrlPr>
+                          <a:rPr lang="en-US" b="0" i="1" smtClean="0">
+                            <a:latin typeface="Cambria Math" panose="02040503050406030204" pitchFamily="18" charset="0"/>
+                          </a:rPr>
+                        </m:ctrlPr>
+                      </m:sSubPr>
+                      <m:e>
+                        <m:r>
+                          <a:rPr lang="en-US" b="0" i="1" smtClean="0">
+                            <a:latin typeface="Cambria Math" panose="02040503050406030204" pitchFamily="18" charset="0"/>
+                          </a:rPr>
+                          <m:t>𝑏</m:t>
+                        </m:r>
+                      </m:e>
+                      <m:sub>
+                        <m:r>
+                          <a:rPr lang="en-US" b="0" i="1" smtClean="0">
+                            <a:latin typeface="Cambria Math" panose="02040503050406030204" pitchFamily="18" charset="0"/>
+                          </a:rPr>
+                          <m:t>𝑘</m:t>
+                        </m:r>
+                      </m:sub>
+                    </m:sSub>
+                  </m:oMath>
+                </a14:m>
+                <a:r>
+                  <a:rPr lang="en-US" dirty="0"/>
+                  <a:t> in the transfer function</a:t>
                 </a:r>
               </a:p>
               <a:p>
@@ -8964,12 +9681,12 @@
             <p:spPr>
               <a:xfrm>
                 <a:off x="457200" y="1142999"/>
-                <a:ext cx="8229600" cy="4572001"/>
+                <a:ext cx="8229600" cy="4980009"/>
               </a:xfrm>
               <a:blipFill>
                 <a:blip r:embed="rId2"/>
                 <a:stretch>
-                  <a:fillRect l="-1389" t="-1381" b="-8840"/>
+                  <a:fillRect l="-1389" t="-1272" b="-254"/>
                 </a:stretch>
               </a:blipFill>
             </p:spPr>
@@ -9033,343 +9750,6 @@
   <p:clrMapOvr>
     <a:masterClrMapping/>
   </p:clrMapOvr>
-  <p:timing>
-    <p:tnLst>
-      <p:par>
-        <p:cTn id="1" dur="indefinite" restart="never" nodeType="tmRoot">
-          <p:childTnLst>
-            <p:seq concurrent="1" nextAc="seek">
-              <p:cTn id="2" dur="indefinite" nodeType="mainSeq">
-                <p:childTnLst>
-                  <p:par>
-                    <p:cTn id="3" fill="hold">
-                      <p:stCondLst>
-                        <p:cond delay="indefinite"/>
-                      </p:stCondLst>
-                      <p:childTnLst>
-                        <p:par>
-                          <p:cTn id="4" fill="hold">
-                            <p:stCondLst>
-                              <p:cond delay="0"/>
-                            </p:stCondLst>
-                            <p:childTnLst>
-                              <p:par>
-                                <p:cTn id="5" presetID="1" presetClass="entr" presetSubtype="0" fill="hold" nodeType="clickEffect">
-                                  <p:stCondLst>
-                                    <p:cond delay="0"/>
-                                  </p:stCondLst>
-                                  <p:childTnLst>
-                                    <p:set>
-                                      <p:cBhvr>
-                                        <p:cTn id="6" dur="1" fill="hold">
-                                          <p:stCondLst>
-                                            <p:cond delay="0"/>
-                                          </p:stCondLst>
-                                        </p:cTn>
-                                        <p:tgtEl>
-                                          <p:spTgt spid="3">
-                                            <p:txEl>
-                                              <p:pRg st="2" end="2"/>
-                                            </p:txEl>
-                                          </p:spTgt>
-                                        </p:tgtEl>
-                                        <p:attrNameLst>
-                                          <p:attrName>style.visibility</p:attrName>
-                                        </p:attrNameLst>
-                                      </p:cBhvr>
-                                      <p:to>
-                                        <p:strVal val="visible"/>
-                                      </p:to>
-                                    </p:set>
-                                  </p:childTnLst>
-                                </p:cTn>
-                              </p:par>
-                            </p:childTnLst>
-                          </p:cTn>
-                        </p:par>
-                      </p:childTnLst>
-                    </p:cTn>
-                  </p:par>
-                  <p:par>
-                    <p:cTn id="7" fill="hold">
-                      <p:stCondLst>
-                        <p:cond delay="indefinite"/>
-                      </p:stCondLst>
-                      <p:childTnLst>
-                        <p:par>
-                          <p:cTn id="8" fill="hold">
-                            <p:stCondLst>
-                              <p:cond delay="0"/>
-                            </p:stCondLst>
-                            <p:childTnLst>
-                              <p:par>
-                                <p:cTn id="9" presetID="1" presetClass="entr" presetSubtype="0" fill="hold" nodeType="clickEffect">
-                                  <p:stCondLst>
-                                    <p:cond delay="0"/>
-                                  </p:stCondLst>
-                                  <p:childTnLst>
-                                    <p:set>
-                                      <p:cBhvr>
-                                        <p:cTn id="10" dur="1" fill="hold">
-                                          <p:stCondLst>
-                                            <p:cond delay="0"/>
-                                          </p:stCondLst>
-                                        </p:cTn>
-                                        <p:tgtEl>
-                                          <p:spTgt spid="3">
-                                            <p:txEl>
-                                              <p:pRg st="3" end="3"/>
-                                            </p:txEl>
-                                          </p:spTgt>
-                                        </p:tgtEl>
-                                        <p:attrNameLst>
-                                          <p:attrName>style.visibility</p:attrName>
-                                        </p:attrNameLst>
-                                      </p:cBhvr>
-                                      <p:to>
-                                        <p:strVal val="visible"/>
-                                      </p:to>
-                                    </p:set>
-                                  </p:childTnLst>
-                                </p:cTn>
-                              </p:par>
-                              <p:par>
-                                <p:cTn id="11" presetID="1" presetClass="entr" presetSubtype="0" fill="hold" nodeType="withEffect">
-                                  <p:stCondLst>
-                                    <p:cond delay="0"/>
-                                  </p:stCondLst>
-                                  <p:childTnLst>
-                                    <p:set>
-                                      <p:cBhvr>
-                                        <p:cTn id="12" dur="1" fill="hold">
-                                          <p:stCondLst>
-                                            <p:cond delay="0"/>
-                                          </p:stCondLst>
-                                        </p:cTn>
-                                        <p:tgtEl>
-                                          <p:spTgt spid="3">
-                                            <p:txEl>
-                                              <p:pRg st="4" end="4"/>
-                                            </p:txEl>
-                                          </p:spTgt>
-                                        </p:tgtEl>
-                                        <p:attrNameLst>
-                                          <p:attrName>style.visibility</p:attrName>
-                                        </p:attrNameLst>
-                                      </p:cBhvr>
-                                      <p:to>
-                                        <p:strVal val="visible"/>
-                                      </p:to>
-                                    </p:set>
-                                  </p:childTnLst>
-                                </p:cTn>
-                              </p:par>
-                            </p:childTnLst>
-                          </p:cTn>
-                        </p:par>
-                      </p:childTnLst>
-                    </p:cTn>
-                  </p:par>
-                  <p:par>
-                    <p:cTn id="13" fill="hold">
-                      <p:stCondLst>
-                        <p:cond delay="indefinite"/>
-                      </p:stCondLst>
-                      <p:childTnLst>
-                        <p:par>
-                          <p:cTn id="14" fill="hold">
-                            <p:stCondLst>
-                              <p:cond delay="0"/>
-                            </p:stCondLst>
-                            <p:childTnLst>
-                              <p:par>
-                                <p:cTn id="15" presetID="1" presetClass="entr" presetSubtype="0" fill="hold" nodeType="clickEffect">
-                                  <p:stCondLst>
-                                    <p:cond delay="0"/>
-                                  </p:stCondLst>
-                                  <p:childTnLst>
-                                    <p:set>
-                                      <p:cBhvr>
-                                        <p:cTn id="16" dur="1" fill="hold">
-                                          <p:stCondLst>
-                                            <p:cond delay="0"/>
-                                          </p:stCondLst>
-                                        </p:cTn>
-                                        <p:tgtEl>
-                                          <p:spTgt spid="3">
-                                            <p:txEl>
-                                              <p:pRg st="5" end="5"/>
-                                            </p:txEl>
-                                          </p:spTgt>
-                                        </p:tgtEl>
-                                        <p:attrNameLst>
-                                          <p:attrName>style.visibility</p:attrName>
-                                        </p:attrNameLst>
-                                      </p:cBhvr>
-                                      <p:to>
-                                        <p:strVal val="visible"/>
-                                      </p:to>
-                                    </p:set>
-                                  </p:childTnLst>
-                                </p:cTn>
-                              </p:par>
-                            </p:childTnLst>
-                          </p:cTn>
-                        </p:par>
-                      </p:childTnLst>
-                    </p:cTn>
-                  </p:par>
-                  <p:par>
-                    <p:cTn id="17" fill="hold">
-                      <p:stCondLst>
-                        <p:cond delay="indefinite"/>
-                      </p:stCondLst>
-                      <p:childTnLst>
-                        <p:par>
-                          <p:cTn id="18" fill="hold">
-                            <p:stCondLst>
-                              <p:cond delay="0"/>
-                            </p:stCondLst>
-                            <p:childTnLst>
-                              <p:par>
-                                <p:cTn id="19" presetID="1" presetClass="entr" presetSubtype="0" fill="hold" nodeType="clickEffect">
-                                  <p:stCondLst>
-                                    <p:cond delay="0"/>
-                                  </p:stCondLst>
-                                  <p:childTnLst>
-                                    <p:set>
-                                      <p:cBhvr>
-                                        <p:cTn id="20" dur="1" fill="hold">
-                                          <p:stCondLst>
-                                            <p:cond delay="0"/>
-                                          </p:stCondLst>
-                                        </p:cTn>
-                                        <p:tgtEl>
-                                          <p:spTgt spid="3">
-                                            <p:txEl>
-                                              <p:pRg st="6" end="6"/>
-                                            </p:txEl>
-                                          </p:spTgt>
-                                        </p:tgtEl>
-                                        <p:attrNameLst>
-                                          <p:attrName>style.visibility</p:attrName>
-                                        </p:attrNameLst>
-                                      </p:cBhvr>
-                                      <p:to>
-                                        <p:strVal val="visible"/>
-                                      </p:to>
-                                    </p:set>
-                                  </p:childTnLst>
-                                </p:cTn>
-                              </p:par>
-                            </p:childTnLst>
-                          </p:cTn>
-                        </p:par>
-                      </p:childTnLst>
-                    </p:cTn>
-                  </p:par>
-                  <p:par>
-                    <p:cTn id="21" fill="hold">
-                      <p:stCondLst>
-                        <p:cond delay="indefinite"/>
-                      </p:stCondLst>
-                      <p:childTnLst>
-                        <p:par>
-                          <p:cTn id="22" fill="hold">
-                            <p:stCondLst>
-                              <p:cond delay="0"/>
-                            </p:stCondLst>
-                            <p:childTnLst>
-                              <p:par>
-                                <p:cTn id="23" presetID="1" presetClass="entr" presetSubtype="0" fill="hold" nodeType="clickEffect">
-                                  <p:stCondLst>
-                                    <p:cond delay="0"/>
-                                  </p:stCondLst>
-                                  <p:childTnLst>
-                                    <p:set>
-                                      <p:cBhvr>
-                                        <p:cTn id="24" dur="1" fill="hold">
-                                          <p:stCondLst>
-                                            <p:cond delay="0"/>
-                                          </p:stCondLst>
-                                        </p:cTn>
-                                        <p:tgtEl>
-                                          <p:spTgt spid="3">
-                                            <p:txEl>
-                                              <p:pRg st="7" end="7"/>
-                                            </p:txEl>
-                                          </p:spTgt>
-                                        </p:tgtEl>
-                                        <p:attrNameLst>
-                                          <p:attrName>style.visibility</p:attrName>
-                                        </p:attrNameLst>
-                                      </p:cBhvr>
-                                      <p:to>
-                                        <p:strVal val="visible"/>
-                                      </p:to>
-                                    </p:set>
-                                  </p:childTnLst>
-                                </p:cTn>
-                              </p:par>
-                              <p:par>
-                                <p:cTn id="25" presetID="1" presetClass="entr" presetSubtype="0" fill="hold" nodeType="withEffect">
-                                  <p:stCondLst>
-                                    <p:cond delay="0"/>
-                                  </p:stCondLst>
-                                  <p:childTnLst>
-                                    <p:set>
-                                      <p:cBhvr>
-                                        <p:cTn id="26" dur="1" fill="hold">
-                                          <p:stCondLst>
-                                            <p:cond delay="0"/>
-                                          </p:stCondLst>
-                                        </p:cTn>
-                                        <p:tgtEl>
-                                          <p:spTgt spid="3">
-                                            <p:txEl>
-                                              <p:pRg st="8" end="8"/>
-                                            </p:txEl>
-                                          </p:spTgt>
-                                        </p:tgtEl>
-                                        <p:attrNameLst>
-                                          <p:attrName>style.visibility</p:attrName>
-                                        </p:attrNameLst>
-                                      </p:cBhvr>
-                                      <p:to>
-                                        <p:strVal val="visible"/>
-                                      </p:to>
-                                    </p:set>
-                                  </p:childTnLst>
-                                </p:cTn>
-                              </p:par>
-                            </p:childTnLst>
-                          </p:cTn>
-                        </p:par>
-                      </p:childTnLst>
-                    </p:cTn>
-                  </p:par>
-                </p:childTnLst>
-              </p:cTn>
-              <p:prevCondLst>
-                <p:cond evt="onPrev" delay="0">
-                  <p:tgtEl>
-                    <p:sldTgt/>
-                  </p:tgtEl>
-                </p:cond>
-              </p:prevCondLst>
-              <p:nextCondLst>
-                <p:cond evt="onNext" delay="0">
-                  <p:tgtEl>
-                    <p:sldTgt/>
-                  </p:tgtEl>
-                </p:cond>
-              </p:nextCondLst>
-            </p:seq>
-          </p:childTnLst>
-        </p:cTn>
-      </p:par>
-    </p:tnLst>
-  </p:timing>
 </p:sld>
 </file>
 
@@ -10441,7 +10821,12 @@
             <p:ph idx="1"/>
           </p:nvPr>
         </p:nvSpPr>
-        <p:spPr/>
+        <p:spPr>
+          <a:xfrm>
+            <a:off x="457200" y="2765064"/>
+            <a:ext cx="8229600" cy="2705879"/>
+          </a:xfrm>
+        </p:spPr>
         <p:txBody>
           <a:bodyPr/>
           <a:lstStyle/>
@@ -10508,6 +10893,428 @@
           </a:p>
         </p:txBody>
       </p:sp>
+      <p:grpSp>
+        <p:nvGrpSpPr>
+          <p:cNvPr id="5" name="Group 4">
+            <a:extLst>
+              <a:ext uri="{FF2B5EF4-FFF2-40B4-BE49-F238E27FC236}">
+                <a16:creationId xmlns:a16="http://schemas.microsoft.com/office/drawing/2014/main" id="{9B8AB077-2053-CFCF-2977-80CE515D9233}"/>
+              </a:ext>
+            </a:extLst>
+          </p:cNvPr>
+          <p:cNvGrpSpPr/>
+          <p:nvPr/>
+        </p:nvGrpSpPr>
+        <p:grpSpPr>
+          <a:xfrm>
+            <a:off x="2770257" y="1366602"/>
+            <a:ext cx="2804066" cy="742764"/>
+            <a:chOff x="2770257" y="1366602"/>
+            <a:chExt cx="2804066" cy="742764"/>
+          </a:xfrm>
+        </p:grpSpPr>
+        <p:sp>
+          <p:nvSpPr>
+            <p:cNvPr id="6" name="Rectangle 5">
+              <a:extLst>
+                <a:ext uri="{FF2B5EF4-FFF2-40B4-BE49-F238E27FC236}">
+                  <a16:creationId xmlns:a16="http://schemas.microsoft.com/office/drawing/2014/main" id="{4B6C835B-357A-B26F-B31B-9B29C18F46DD}"/>
+                </a:ext>
+              </a:extLst>
+            </p:cNvPr>
+            <p:cNvSpPr>
+              <a:spLocks noChangeAspect="1"/>
+            </p:cNvSpPr>
+            <p:nvPr/>
+          </p:nvSpPr>
+          <p:spPr>
+            <a:xfrm>
+              <a:off x="3620277" y="1474417"/>
+              <a:ext cx="1095847" cy="634949"/>
+            </a:xfrm>
+            <a:prstGeom prst="rect">
+              <a:avLst/>
+            </a:prstGeom>
+          </p:spPr>
+          <p:style>
+            <a:lnRef idx="1">
+              <a:schemeClr val="accent1"/>
+            </a:lnRef>
+            <a:fillRef idx="3">
+              <a:schemeClr val="accent1"/>
+            </a:fillRef>
+            <a:effectRef idx="2">
+              <a:schemeClr val="accent1"/>
+            </a:effectRef>
+            <a:fontRef idx="minor">
+              <a:schemeClr val="lt1"/>
+            </a:fontRef>
+          </p:style>
+          <p:txBody>
+            <a:bodyPr rtlCol="0" anchor="ctr"/>
+            <a:lstStyle/>
+            <a:p>
+              <a:pPr algn="ctr"/>
+              <a:r>
+                <a:rPr lang="en-US" sz="2000" dirty="0"/>
+                <a:t>System</a:t>
+              </a:r>
+            </a:p>
+          </p:txBody>
+        </p:sp>
+        <p:cxnSp>
+          <p:nvCxnSpPr>
+            <p:cNvPr id="7" name="Straight Arrow Connector 6">
+              <a:extLst>
+                <a:ext uri="{FF2B5EF4-FFF2-40B4-BE49-F238E27FC236}">
+                  <a16:creationId xmlns:a16="http://schemas.microsoft.com/office/drawing/2014/main" id="{ABB35C73-AA12-C2FC-40F8-C5878581D377}"/>
+                </a:ext>
+              </a:extLst>
+            </p:cNvPr>
+            <p:cNvCxnSpPr>
+              <a:cxnSpLocks/>
+              <a:endCxn id="6" idx="1"/>
+            </p:cNvCxnSpPr>
+            <p:nvPr/>
+          </p:nvCxnSpPr>
+          <p:spPr>
+            <a:xfrm flipV="1">
+              <a:off x="2770257" y="1791892"/>
+              <a:ext cx="850020" cy="3628"/>
+            </a:xfrm>
+            <a:prstGeom prst="straightConnector1">
+              <a:avLst/>
+            </a:prstGeom>
+            <a:ln>
+              <a:tailEnd type="triangle" w="lg" len="lg"/>
+            </a:ln>
+            <a:effectLst>
+              <a:outerShdw dist="20000" sx="1000" sy="1000" rotWithShape="0">
+                <a:srgbClr val="000000"/>
+              </a:outerShdw>
+            </a:effectLst>
+          </p:spPr>
+          <p:style>
+            <a:lnRef idx="2">
+              <a:schemeClr val="accent1"/>
+            </a:lnRef>
+            <a:fillRef idx="0">
+              <a:schemeClr val="accent1"/>
+            </a:fillRef>
+            <a:effectRef idx="1">
+              <a:schemeClr val="accent1"/>
+            </a:effectRef>
+            <a:fontRef idx="minor">
+              <a:schemeClr val="tx1"/>
+            </a:fontRef>
+          </p:style>
+        </p:cxnSp>
+        <mc:AlternateContent xmlns:mc="http://schemas.openxmlformats.org/markup-compatibility/2006" xmlns:a14="http://schemas.microsoft.com/office/drawing/2010/main">
+          <mc:Choice Requires="a14">
+            <p:sp>
+              <p:nvSpPr>
+                <p:cNvPr id="8" name="Rectangle 7">
+                  <a:extLst>
+                    <a:ext uri="{FF2B5EF4-FFF2-40B4-BE49-F238E27FC236}">
+                      <a16:creationId xmlns:a16="http://schemas.microsoft.com/office/drawing/2014/main" id="{53F3A901-1E9B-F409-0FBE-EC8BD05883D2}"/>
+                    </a:ext>
+                  </a:extLst>
+                </p:cNvPr>
+                <p:cNvSpPr/>
+                <p:nvPr/>
+              </p:nvSpPr>
+              <p:spPr>
+                <a:xfrm>
+                  <a:off x="2843567" y="1387057"/>
+                  <a:ext cx="716478" cy="307777"/>
+                </a:xfrm>
+                <a:prstGeom prst="rect">
+                  <a:avLst/>
+                </a:prstGeom>
+              </p:spPr>
+              <p:txBody>
+                <a:bodyPr wrap="square">
+                  <a:spAutoFit/>
+                </a:bodyPr>
+                <a:lstStyle/>
+                <a:p>
+                  <a:pPr/>
+                  <a14:m>
+                    <m:oMathPara xmlns:m="http://schemas.openxmlformats.org/officeDocument/2006/math">
+                      <m:oMathParaPr>
+                        <m:jc m:val="centerGroup"/>
+                      </m:oMathParaPr>
+                      <m:oMath xmlns:m="http://schemas.openxmlformats.org/officeDocument/2006/math">
+                        <m:r>
+                          <a:rPr lang="en-US" b="0" i="1" smtClean="0">
+                            <a:solidFill>
+                              <a:schemeClr val="tx1"/>
+                            </a:solidFill>
+                            <a:latin typeface="Cambria Math" panose="02040503050406030204" pitchFamily="18" charset="0"/>
+                          </a:rPr>
+                          <m:t>𝑢</m:t>
+                        </m:r>
+                        <m:r>
+                          <a:rPr lang="en-US" b="0" i="1" smtClean="0">
+                            <a:solidFill>
+                              <a:schemeClr val="tx1"/>
+                            </a:solidFill>
+                            <a:latin typeface="Cambria Math" panose="02040503050406030204" pitchFamily="18" charset="0"/>
+                          </a:rPr>
+                          <m:t>(</m:t>
+                        </m:r>
+                        <m:r>
+                          <a:rPr lang="en-US" b="0" i="1" smtClean="0">
+                            <a:solidFill>
+                              <a:schemeClr val="tx1"/>
+                            </a:solidFill>
+                            <a:latin typeface="Cambria Math" panose="02040503050406030204" pitchFamily="18" charset="0"/>
+                          </a:rPr>
+                          <m:t>𝑡</m:t>
+                        </m:r>
+                        <m:r>
+                          <a:rPr lang="en-US" b="0" i="1" smtClean="0">
+                            <a:solidFill>
+                              <a:schemeClr val="tx1"/>
+                            </a:solidFill>
+                            <a:latin typeface="Cambria Math" panose="02040503050406030204" pitchFamily="18" charset="0"/>
+                          </a:rPr>
+                          <m:t>)</m:t>
+                        </m:r>
+                      </m:oMath>
+                    </m:oMathPara>
+                  </a14:m>
+                  <a:endParaRPr lang="en-US" dirty="0">
+                    <a:solidFill>
+                      <a:schemeClr val="tx1"/>
+                    </a:solidFill>
+                  </a:endParaRPr>
+                </a:p>
+              </p:txBody>
+            </p:sp>
+          </mc:Choice>
+          <mc:Fallback xmlns="">
+            <p:sp>
+              <p:nvSpPr>
+                <p:cNvPr id="8" name="Rectangle 7">
+                  <a:extLst>
+                    <a:ext uri="{FF2B5EF4-FFF2-40B4-BE49-F238E27FC236}">
+                      <a16:creationId xmlns:a16="http://schemas.microsoft.com/office/drawing/2014/main" id="{1040BB5E-4B41-0B62-A18B-22BA948ADF2C}"/>
+                    </a:ext>
+                  </a:extLst>
+                </p:cNvPr>
+                <p:cNvSpPr>
+                  <a:spLocks noRot="1" noChangeAspect="1" noMove="1" noResize="1" noEditPoints="1" noAdjustHandles="1" noChangeArrowheads="1" noChangeShapeType="1" noTextEdit="1"/>
+                </p:cNvSpPr>
+                <p:nvPr/>
+              </p:nvSpPr>
+              <p:spPr>
+                <a:xfrm>
+                  <a:off x="2843567" y="1387057"/>
+                  <a:ext cx="716478" cy="307777"/>
+                </a:xfrm>
+                <a:prstGeom prst="rect">
+                  <a:avLst/>
+                </a:prstGeom>
+                <a:blipFill>
+                  <a:blip r:embed="rId3"/>
+                  <a:stretch>
+                    <a:fillRect b="-40000"/>
+                  </a:stretch>
+                </a:blipFill>
+              </p:spPr>
+              <p:txBody>
+                <a:bodyPr/>
+                <a:lstStyle/>
+                <a:p>
+                  <a:r>
+                    <a:rPr lang="en-US">
+                      <a:noFill/>
+                    </a:rPr>
+                    <a:t> </a:t>
+                  </a:r>
+                </a:p>
+              </p:txBody>
+            </p:sp>
+          </mc:Fallback>
+        </mc:AlternateContent>
+        <p:cxnSp>
+          <p:nvCxnSpPr>
+            <p:cNvPr id="9" name="Straight Arrow Connector 8">
+              <a:extLst>
+                <a:ext uri="{FF2B5EF4-FFF2-40B4-BE49-F238E27FC236}">
+                  <a16:creationId xmlns:a16="http://schemas.microsoft.com/office/drawing/2014/main" id="{E7804FD4-ED5A-D2F5-C4B5-1C83A6C78AF6}"/>
+                </a:ext>
+              </a:extLst>
+            </p:cNvPr>
+            <p:cNvCxnSpPr>
+              <a:cxnSpLocks/>
+              <a:stCxn id="6" idx="3"/>
+            </p:cNvCxnSpPr>
+            <p:nvPr/>
+          </p:nvCxnSpPr>
+          <p:spPr>
+            <a:xfrm>
+              <a:off x="4716124" y="1791892"/>
+              <a:ext cx="858199" cy="3628"/>
+            </a:xfrm>
+            <a:prstGeom prst="straightConnector1">
+              <a:avLst/>
+            </a:prstGeom>
+            <a:ln>
+              <a:tailEnd type="triangle" w="lg" len="lg"/>
+            </a:ln>
+            <a:effectLst>
+              <a:outerShdw dist="20000" sx="1000" sy="1000" rotWithShape="0">
+                <a:srgbClr val="000000"/>
+              </a:outerShdw>
+            </a:effectLst>
+          </p:spPr>
+          <p:style>
+            <a:lnRef idx="2">
+              <a:schemeClr val="accent1"/>
+            </a:lnRef>
+            <a:fillRef idx="0">
+              <a:schemeClr val="accent1"/>
+            </a:fillRef>
+            <a:effectRef idx="1">
+              <a:schemeClr val="accent1"/>
+            </a:effectRef>
+            <a:fontRef idx="minor">
+              <a:schemeClr val="tx1"/>
+            </a:fontRef>
+          </p:style>
+        </p:cxnSp>
+        <mc:AlternateContent xmlns:mc="http://schemas.openxmlformats.org/markup-compatibility/2006" xmlns:a14="http://schemas.microsoft.com/office/drawing/2010/main">
+          <mc:Choice Requires="a14">
+            <p:sp>
+              <p:nvSpPr>
+                <p:cNvPr id="10" name="Rectangle 9">
+                  <a:extLst>
+                    <a:ext uri="{FF2B5EF4-FFF2-40B4-BE49-F238E27FC236}">
+                      <a16:creationId xmlns:a16="http://schemas.microsoft.com/office/drawing/2014/main" id="{0722185E-FF5E-3FF7-4AE4-575B0E9DA7EB}"/>
+                    </a:ext>
+                  </a:extLst>
+                </p:cNvPr>
+                <p:cNvSpPr/>
+                <p:nvPr/>
+              </p:nvSpPr>
+              <p:spPr>
+                <a:xfrm>
+                  <a:off x="4770301" y="1366602"/>
+                  <a:ext cx="716478" cy="369332"/>
+                </a:xfrm>
+                <a:prstGeom prst="rect">
+                  <a:avLst/>
+                </a:prstGeom>
+              </p:spPr>
+              <p:txBody>
+                <a:bodyPr wrap="square">
+                  <a:spAutoFit/>
+                </a:bodyPr>
+                <a:lstStyle/>
+                <a:p>
+                  <a:pPr/>
+                  <a14:m>
+                    <m:oMathPara xmlns:m="http://schemas.openxmlformats.org/officeDocument/2006/math">
+                      <m:oMathParaPr>
+                        <m:jc m:val="centerGroup"/>
+                      </m:oMathParaPr>
+                      <m:oMath xmlns:m="http://schemas.openxmlformats.org/officeDocument/2006/math">
+                        <m:r>
+                          <a:rPr lang="en-US" b="0" i="1" smtClean="0">
+                            <a:solidFill>
+                              <a:schemeClr val="tx1"/>
+                            </a:solidFill>
+                            <a:latin typeface="Cambria Math" panose="02040503050406030204" pitchFamily="18" charset="0"/>
+                          </a:rPr>
+                          <m:t>𝑦</m:t>
+                        </m:r>
+                        <m:r>
+                          <a:rPr lang="en-US" b="0" i="1" smtClean="0">
+                            <a:solidFill>
+                              <a:schemeClr val="tx1"/>
+                            </a:solidFill>
+                            <a:latin typeface="Cambria Math" panose="02040503050406030204" pitchFamily="18" charset="0"/>
+                          </a:rPr>
+                          <m:t>(</m:t>
+                        </m:r>
+                        <m:r>
+                          <a:rPr lang="en-US" b="0" i="1" smtClean="0">
+                            <a:solidFill>
+                              <a:schemeClr val="tx1"/>
+                            </a:solidFill>
+                            <a:latin typeface="Cambria Math" panose="02040503050406030204" pitchFamily="18" charset="0"/>
+                          </a:rPr>
+                          <m:t>𝑡</m:t>
+                        </m:r>
+                        <m:r>
+                          <a:rPr lang="en-US" b="0" i="1" smtClean="0">
+                            <a:solidFill>
+                              <a:schemeClr val="tx1"/>
+                            </a:solidFill>
+                            <a:latin typeface="Cambria Math" panose="02040503050406030204" pitchFamily="18" charset="0"/>
+                          </a:rPr>
+                          <m:t>)</m:t>
+                        </m:r>
+                      </m:oMath>
+                    </m:oMathPara>
+                  </a14:m>
+                  <a:endParaRPr lang="en-US" dirty="0">
+                    <a:solidFill>
+                      <a:schemeClr val="tx1"/>
+                    </a:solidFill>
+                  </a:endParaRPr>
+                </a:p>
+              </p:txBody>
+            </p:sp>
+          </mc:Choice>
+          <mc:Fallback xmlns="">
+            <p:sp>
+              <p:nvSpPr>
+                <p:cNvPr id="11" name="Rectangle 10">
+                  <a:extLst>
+                    <a:ext uri="{FF2B5EF4-FFF2-40B4-BE49-F238E27FC236}">
+                      <a16:creationId xmlns:a16="http://schemas.microsoft.com/office/drawing/2014/main" id="{EDB9C73A-BFA5-B6D0-A4DA-496E4FAEB507}"/>
+                    </a:ext>
+                  </a:extLst>
+                </p:cNvPr>
+                <p:cNvSpPr>
+                  <a:spLocks noRot="1" noChangeAspect="1" noMove="1" noResize="1" noEditPoints="1" noAdjustHandles="1" noChangeArrowheads="1" noChangeShapeType="1" noTextEdit="1"/>
+                </p:cNvSpPr>
+                <p:nvPr/>
+              </p:nvSpPr>
+              <p:spPr>
+                <a:xfrm>
+                  <a:off x="4770301" y="1366602"/>
+                  <a:ext cx="716478" cy="369332"/>
+                </a:xfrm>
+                <a:prstGeom prst="rect">
+                  <a:avLst/>
+                </a:prstGeom>
+                <a:blipFill>
+                  <a:blip r:embed="rId4"/>
+                  <a:stretch>
+                    <a:fillRect b="-20000"/>
+                  </a:stretch>
+                </a:blipFill>
+              </p:spPr>
+              <p:txBody>
+                <a:bodyPr/>
+                <a:lstStyle/>
+                <a:p>
+                  <a:r>
+                    <a:rPr lang="en-US">
+                      <a:noFill/>
+                    </a:rPr>
+                    <a:t> </a:t>
+                  </a:r>
+                </a:p>
+              </p:txBody>
+            </p:sp>
+          </mc:Fallback>
+        </mc:AlternateContent>
+      </p:grpSp>
     </p:spTree>
     <p:extLst>
       <p:ext uri="{BB962C8B-B14F-4D97-AF65-F5344CB8AC3E}">
@@ -10939,8 +11746,8 @@
           </a:p>
         </p:txBody>
       </p:sp>
-      <mc:AlternateContent xmlns:mc="http://schemas.openxmlformats.org/markup-compatibility/2006">
-        <mc:Choice xmlns:a14="http://schemas.microsoft.com/office/drawing/2010/main" Requires="a14">
+      <mc:AlternateContent xmlns:mc="http://schemas.openxmlformats.org/markup-compatibility/2006" xmlns:a14="http://schemas.microsoft.com/office/drawing/2010/main">
+        <mc:Choice Requires="a14">
           <p:sp>
             <p:nvSpPr>
               <p:cNvPr id="3" name="Content Placeholder 2">
@@ -12025,7 +12832,7 @@
             </p:txBody>
           </p:sp>
         </mc:Choice>
-        <mc:Fallback>
+        <mc:Fallback xmlns="">
           <p:sp>
             <p:nvSpPr>
               <p:cNvPr id="3" name="Content Placeholder 2">
@@ -12781,7 +13588,7 @@
           <a:p>
             <a:r>
               <a:rPr lang="en-US" dirty="0"/>
-              <a:t>Predictions from a good model has small deviations from the experimental data.</a:t>
+              <a:t>Predictions from a good model have small deviations from the experimental data.</a:t>
             </a:r>
           </a:p>
         </p:txBody>
@@ -13608,13 +14415,7 @@
       </p:grpSpPr>
       <p:sp>
         <p:nvSpPr>
-          <p:cNvPr id="2" name="Title 1">
-            <a:extLst>
-              <a:ext uri="{FF2B5EF4-FFF2-40B4-BE49-F238E27FC236}">
-                <a16:creationId xmlns:a16="http://schemas.microsoft.com/office/drawing/2014/main" id="{EDF021D6-61A7-274E-A332-2D0E2CA02CA3}"/>
-              </a:ext>
-            </a:extLst>
-          </p:cNvPr>
+          <p:cNvPr id="2" name="Title 1"/>
           <p:cNvSpPr>
             <a:spLocks noGrp="1"/>
           </p:cNvSpPr>
@@ -13629,594 +14430,135 @@
           <a:p>
             <a:r>
               <a:rPr lang="en-US" dirty="0"/>
-              <a:t>What Residuals Tell Us About Models</a:t>
+              <a:t>Under fitting</a:t>
             </a:r>
           </a:p>
         </p:txBody>
       </p:sp>
       <p:sp>
         <p:nvSpPr>
-          <p:cNvPr id="3" name="Slide Number Placeholder 2">
-            <a:extLst>
-              <a:ext uri="{FF2B5EF4-FFF2-40B4-BE49-F238E27FC236}">
-                <a16:creationId xmlns:a16="http://schemas.microsoft.com/office/drawing/2014/main" id="{BA82D6E1-D053-7F46-B22C-11F5D8AD40BA}"/>
-              </a:ext>
-            </a:extLst>
-          </p:cNvPr>
-          <p:cNvSpPr>
-            <a:spLocks noGrp="1"/>
-          </p:cNvSpPr>
-          <p:nvPr>
-            <p:ph type="sldNum" sz="quarter" idx="11"/>
-          </p:nvPr>
+          <p:cNvPr id="16" name="TextBox 15"/>
+          <p:cNvSpPr txBox="1"/>
+          <p:nvPr/>
         </p:nvSpPr>
-        <p:spPr/>
+        <p:spPr>
+          <a:xfrm>
+            <a:off x="1242507" y="2376285"/>
+            <a:ext cx="1633781" cy="415498"/>
+          </a:xfrm>
+          <a:prstGeom prst="rect">
+            <a:avLst/>
+          </a:prstGeom>
+          <a:noFill/>
+        </p:spPr>
         <p:txBody>
-          <a:bodyPr/>
+          <a:bodyPr wrap="none" rtlCol="0">
+            <a:spAutoFit/>
+          </a:bodyPr>
           <a:lstStyle/>
           <a:p>
-            <a:pPr>
-              <a:defRPr/>
-            </a:pPr>
-            <a:fld id="{2E4304A7-0FB2-4094-BC1E-DB17183AD0C1}" type="slidenum">
-              <a:rPr lang="en-US" altLang="x-none" smtClean="0"/>
-              <a:pPr>
-                <a:defRPr/>
-              </a:pPr>
-              <a:t>8</a:t>
-            </a:fld>
-            <a:endParaRPr lang="en-US" altLang="x-none"/>
+            <a:r>
+              <a:rPr lang="en-US" sz="2100" dirty="0">
+                <a:solidFill>
+                  <a:srgbClr val="FF0000"/>
+                </a:solidFill>
+              </a:rPr>
+              <a:t>Under fitting</a:t>
+            </a:r>
           </a:p>
         </p:txBody>
       </p:sp>
-      <p:grpSp>
-        <p:nvGrpSpPr>
-          <p:cNvPr id="17" name="Group 16">
-            <a:extLst>
-              <a:ext uri="{FF2B5EF4-FFF2-40B4-BE49-F238E27FC236}">
-                <a16:creationId xmlns:a16="http://schemas.microsoft.com/office/drawing/2014/main" id="{F073A3CB-0F31-3445-B8D3-1B08798BE47D}"/>
-              </a:ext>
-            </a:extLst>
-          </p:cNvPr>
-          <p:cNvGrpSpPr/>
+      <p:pic>
+        <p:nvPicPr>
+          <p:cNvPr id="8" name="Picture 7"/>
+          <p:cNvPicPr>
+            <a:picLocks noChangeAspect="1"/>
+          </p:cNvPicPr>
           <p:nvPr/>
-        </p:nvGrpSpPr>
-        <p:grpSpPr>
+        </p:nvPicPr>
+        <p:blipFill>
+          <a:blip r:embed="rId2"/>
+          <a:stretch>
+            <a:fillRect/>
+          </a:stretch>
+        </p:blipFill>
+        <p:spPr>
           <a:xfrm>
-            <a:off x="5143500" y="1450875"/>
-            <a:ext cx="2071205" cy="2092426"/>
-            <a:chOff x="5334000" y="791499"/>
-            <a:chExt cx="2761606" cy="2789901"/>
+            <a:off x="628650" y="3019719"/>
+            <a:ext cx="3429297" cy="2057579"/>
           </a:xfrm>
-        </p:grpSpPr>
-        <p:pic>
-          <p:nvPicPr>
-            <p:cNvPr id="9" name="Picture 8">
-              <a:extLst>
-                <a:ext uri="{FF2B5EF4-FFF2-40B4-BE49-F238E27FC236}">
-                  <a16:creationId xmlns:a16="http://schemas.microsoft.com/office/drawing/2014/main" id="{19A1125C-DB23-BD43-A4FB-C38B33AE9CED}"/>
-                </a:ext>
-              </a:extLst>
-            </p:cNvPr>
-            <p:cNvPicPr>
-              <a:picLocks noChangeAspect="1"/>
-            </p:cNvPicPr>
-            <p:nvPr/>
-          </p:nvPicPr>
-          <p:blipFill>
-            <a:blip r:embed="rId2"/>
-            <a:stretch>
-              <a:fillRect/>
-            </a:stretch>
-          </p:blipFill>
-          <p:spPr>
-            <a:xfrm>
-              <a:off x="5334000" y="1219200"/>
-              <a:ext cx="2761606" cy="2362200"/>
-            </a:xfrm>
-            <a:prstGeom prst="rect">
-              <a:avLst/>
-            </a:prstGeom>
-          </p:spPr>
-        </p:pic>
-        <p:sp>
-          <p:nvSpPr>
-            <p:cNvPr id="10" name="TextBox 9">
-              <a:extLst>
-                <a:ext uri="{FF2B5EF4-FFF2-40B4-BE49-F238E27FC236}">
-                  <a16:creationId xmlns:a16="http://schemas.microsoft.com/office/drawing/2014/main" id="{C294F186-587E-5140-A35A-E0142D03A0E1}"/>
-                </a:ext>
-              </a:extLst>
-            </p:cNvPr>
-            <p:cNvSpPr txBox="1"/>
-            <p:nvPr/>
-          </p:nvSpPr>
-          <p:spPr>
-            <a:xfrm>
-              <a:off x="5562600" y="791499"/>
-              <a:ext cx="2003112" cy="430887"/>
-            </a:xfrm>
-            <a:prstGeom prst="rect">
-              <a:avLst/>
-            </a:prstGeom>
-            <a:noFill/>
-          </p:spPr>
-          <p:txBody>
-            <a:bodyPr wrap="none" rtlCol="0">
-              <a:spAutoFit/>
-            </a:bodyPr>
-            <a:lstStyle/>
-            <a:p>
-              <a:r>
-                <a:rPr lang="en-US" sz="1500" dirty="0"/>
-                <a:t>Functional Bias</a:t>
-              </a:r>
-            </a:p>
-          </p:txBody>
-        </p:sp>
-      </p:grpSp>
-      <p:grpSp>
-        <p:nvGrpSpPr>
-          <p:cNvPr id="16" name="Group 15">
-            <a:extLst>
-              <a:ext uri="{FF2B5EF4-FFF2-40B4-BE49-F238E27FC236}">
-                <a16:creationId xmlns:a16="http://schemas.microsoft.com/office/drawing/2014/main" id="{EDC4810E-683A-0C4C-8B89-DA843C76169F}"/>
-              </a:ext>
-            </a:extLst>
-          </p:cNvPr>
-          <p:cNvGrpSpPr/>
+          <a:prstGeom prst="rect">
+            <a:avLst/>
+          </a:prstGeom>
+        </p:spPr>
+      </p:pic>
+      <p:pic>
+        <p:nvPicPr>
+          <p:cNvPr id="10" name="Picture 9"/>
+          <p:cNvPicPr>
+            <a:picLocks noChangeAspect="1"/>
+          </p:cNvPicPr>
           <p:nvPr/>
-        </p:nvGrpSpPr>
-        <p:grpSpPr>
+        </p:nvPicPr>
+        <p:blipFill>
+          <a:blip r:embed="rId3"/>
+          <a:stretch>
+            <a:fillRect/>
+          </a:stretch>
+        </p:blipFill>
+        <p:spPr>
           <a:xfrm>
-            <a:off x="1799045" y="1485900"/>
-            <a:ext cx="2585807" cy="2352675"/>
-            <a:chOff x="2876550" y="3703983"/>
-            <a:chExt cx="3447743" cy="3136900"/>
+            <a:off x="4664636" y="3019719"/>
+            <a:ext cx="3429297" cy="2057579"/>
           </a:xfrm>
-        </p:grpSpPr>
-        <p:pic>
-          <p:nvPicPr>
-            <p:cNvPr id="13" name="Picture 12">
-              <a:extLst>
-                <a:ext uri="{FF2B5EF4-FFF2-40B4-BE49-F238E27FC236}">
-                  <a16:creationId xmlns:a16="http://schemas.microsoft.com/office/drawing/2014/main" id="{3C30F030-9E6C-8F43-AEF9-08E7B4FB2333}"/>
-                </a:ext>
-              </a:extLst>
-            </p:cNvPr>
-            <p:cNvPicPr>
-              <a:picLocks noChangeAspect="1"/>
-            </p:cNvPicPr>
-            <p:nvPr/>
-          </p:nvPicPr>
-          <p:blipFill>
-            <a:blip r:embed="rId3"/>
-            <a:stretch>
-              <a:fillRect/>
-            </a:stretch>
-          </p:blipFill>
-          <p:spPr>
-            <a:xfrm>
-              <a:off x="2876550" y="3703983"/>
-              <a:ext cx="3390900" cy="3136900"/>
-            </a:xfrm>
-            <a:prstGeom prst="rect">
-              <a:avLst/>
-            </a:prstGeom>
-          </p:spPr>
-        </p:pic>
-        <p:sp>
-          <p:nvSpPr>
-            <p:cNvPr id="14" name="TextBox 13">
-              <a:extLst>
-                <a:ext uri="{FF2B5EF4-FFF2-40B4-BE49-F238E27FC236}">
-                  <a16:creationId xmlns:a16="http://schemas.microsoft.com/office/drawing/2014/main" id="{2B4F95A9-E797-574B-8241-5DDA4647FB38}"/>
-                </a:ext>
-              </a:extLst>
-            </p:cNvPr>
-            <p:cNvSpPr txBox="1"/>
-            <p:nvPr/>
-          </p:nvSpPr>
-          <p:spPr>
-            <a:xfrm>
-              <a:off x="4592622" y="3703983"/>
-              <a:ext cx="1731671" cy="430887"/>
-            </a:xfrm>
-            <a:prstGeom prst="rect">
-              <a:avLst/>
-            </a:prstGeom>
-            <a:noFill/>
-          </p:spPr>
-          <p:txBody>
-            <a:bodyPr wrap="none" rtlCol="0">
-              <a:spAutoFit/>
-            </a:bodyPr>
-            <a:lstStyle/>
-            <a:p>
-              <a:r>
-                <a:rPr lang="en-US" sz="1500" dirty="0"/>
-                <a:t>Likely Outlier</a:t>
-              </a:r>
-            </a:p>
-          </p:txBody>
-        </p:sp>
-      </p:grpSp>
-      <p:grpSp>
-        <p:nvGrpSpPr>
-          <p:cNvPr id="15" name="Group 14">
-            <a:extLst>
-              <a:ext uri="{FF2B5EF4-FFF2-40B4-BE49-F238E27FC236}">
-                <a16:creationId xmlns:a16="http://schemas.microsoft.com/office/drawing/2014/main" id="{53A85C2E-618D-AF4E-9FF0-752109F588F1}"/>
-              </a:ext>
-            </a:extLst>
-          </p:cNvPr>
-          <p:cNvGrpSpPr/>
+          <a:prstGeom prst="rect">
+            <a:avLst/>
+          </a:prstGeom>
+        </p:spPr>
+      </p:pic>
+      <p:sp>
+        <p:nvSpPr>
+          <p:cNvPr id="12" name="TextBox 11"/>
+          <p:cNvSpPr txBox="1"/>
           <p:nvPr/>
-        </p:nvGrpSpPr>
-        <p:grpSpPr>
+        </p:nvSpPr>
+        <p:spPr>
           <a:xfrm>
-            <a:off x="1543050" y="3971013"/>
-            <a:ext cx="2857500" cy="1771579"/>
-            <a:chOff x="457200" y="1096299"/>
-            <a:chExt cx="3810000" cy="2362105"/>
+            <a:off x="5520016" y="2376285"/>
+            <a:ext cx="1887055" cy="415498"/>
           </a:xfrm>
-          <a:solidFill>
-            <a:schemeClr val="bg1"/>
-          </a:solidFill>
-        </p:grpSpPr>
-        <p:pic>
-          <p:nvPicPr>
-            <p:cNvPr id="5" name="Picture 4">
-              <a:extLst>
-                <a:ext uri="{FF2B5EF4-FFF2-40B4-BE49-F238E27FC236}">
-                  <a16:creationId xmlns:a16="http://schemas.microsoft.com/office/drawing/2014/main" id="{43A6F7B3-8448-FA46-A70F-0013357393A1}"/>
-                </a:ext>
-              </a:extLst>
-            </p:cNvPr>
-            <p:cNvPicPr>
-              <a:picLocks noChangeAspect="1"/>
-            </p:cNvPicPr>
-            <p:nvPr/>
-          </p:nvPicPr>
-          <p:blipFill>
-            <a:blip r:embed="rId4"/>
-            <a:stretch>
-              <a:fillRect/>
-            </a:stretch>
-          </p:blipFill>
-          <p:spPr>
-            <a:xfrm>
-              <a:off x="914400" y="1267749"/>
-              <a:ext cx="3270250" cy="2152650"/>
-            </a:xfrm>
-            <a:prstGeom prst="rect">
-              <a:avLst/>
-            </a:prstGeom>
-            <a:grpFill/>
-          </p:spPr>
-        </p:pic>
-        <p:sp>
-          <p:nvSpPr>
-            <p:cNvPr id="6" name="Rectangle 5">
-              <a:extLst>
-                <a:ext uri="{FF2B5EF4-FFF2-40B4-BE49-F238E27FC236}">
-                  <a16:creationId xmlns:a16="http://schemas.microsoft.com/office/drawing/2014/main" id="{7D575970-1478-014D-99B7-3351955BDAF1}"/>
-                </a:ext>
-              </a:extLst>
-            </p:cNvPr>
-            <p:cNvSpPr/>
-            <p:nvPr/>
-          </p:nvSpPr>
-          <p:spPr>
-            <a:xfrm>
-              <a:off x="457200" y="1229743"/>
-              <a:ext cx="685800" cy="2228661"/>
-            </a:xfrm>
-            <a:prstGeom prst="rect">
-              <a:avLst/>
-            </a:prstGeom>
-            <a:grpFill/>
-            <a:ln>
-              <a:solidFill>
-                <a:schemeClr val="bg1"/>
-              </a:solidFill>
-            </a:ln>
-            <a:effectLst>
-              <a:outerShdw dist="23000" sx="1000" sy="1000" rotWithShape="0">
-                <a:srgbClr val="000000"/>
-              </a:outerShdw>
-            </a:effectLst>
-          </p:spPr>
-          <p:style>
-            <a:lnRef idx="1">
-              <a:schemeClr val="accent1"/>
-            </a:lnRef>
-            <a:fillRef idx="3">
-              <a:schemeClr val="accent1"/>
-            </a:fillRef>
-            <a:effectRef idx="2">
-              <a:schemeClr val="accent1"/>
-            </a:effectRef>
-            <a:fontRef idx="minor">
-              <a:schemeClr val="lt1"/>
-            </a:fontRef>
-          </p:style>
-          <p:txBody>
-            <a:bodyPr rtlCol="0" anchor="ctr"/>
-            <a:lstStyle/>
-            <a:p>
-              <a:pPr algn="ctr"/>
-              <a:endParaRPr lang="en-US"/>
-            </a:p>
-          </p:txBody>
-        </p:sp>
-        <p:sp>
-          <p:nvSpPr>
-            <p:cNvPr id="7" name="Rectangle 6">
-              <a:extLst>
-                <a:ext uri="{FF2B5EF4-FFF2-40B4-BE49-F238E27FC236}">
-                  <a16:creationId xmlns:a16="http://schemas.microsoft.com/office/drawing/2014/main" id="{7A3F0F30-4157-2C43-A7B7-4EFCFFC4DE98}"/>
-                </a:ext>
-              </a:extLst>
-            </p:cNvPr>
-            <p:cNvSpPr/>
-            <p:nvPr/>
-          </p:nvSpPr>
-          <p:spPr>
-            <a:xfrm>
-              <a:off x="571500" y="1096299"/>
-              <a:ext cx="3695700" cy="245803"/>
-            </a:xfrm>
-            <a:prstGeom prst="rect">
-              <a:avLst/>
-            </a:prstGeom>
-            <a:grpFill/>
-            <a:ln>
-              <a:solidFill>
-                <a:schemeClr val="bg1"/>
-              </a:solidFill>
-            </a:ln>
-            <a:effectLst>
-              <a:outerShdw dist="23000" sx="1000" sy="1000" rotWithShape="0">
-                <a:srgbClr val="000000"/>
-              </a:outerShdw>
-            </a:effectLst>
-          </p:spPr>
-          <p:style>
-            <a:lnRef idx="1">
-              <a:schemeClr val="accent1"/>
-            </a:lnRef>
-            <a:fillRef idx="3">
-              <a:schemeClr val="accent1"/>
-            </a:fillRef>
-            <a:effectRef idx="2">
-              <a:schemeClr val="accent1"/>
-            </a:effectRef>
-            <a:fontRef idx="minor">
-              <a:schemeClr val="lt1"/>
-            </a:fontRef>
-          </p:style>
-          <p:txBody>
-            <a:bodyPr rtlCol="0" anchor="ctr"/>
-            <a:lstStyle/>
-            <a:p>
-              <a:pPr algn="ctr"/>
-              <a:endParaRPr lang="en-US"/>
-            </a:p>
-          </p:txBody>
-        </p:sp>
-        <p:sp>
-          <p:nvSpPr>
-            <p:cNvPr id="11" name="TextBox 10">
-              <a:extLst>
-                <a:ext uri="{FF2B5EF4-FFF2-40B4-BE49-F238E27FC236}">
-                  <a16:creationId xmlns:a16="http://schemas.microsoft.com/office/drawing/2014/main" id="{168ED7C9-949E-4641-BB61-7C0673B533E5}"/>
-                </a:ext>
-              </a:extLst>
-            </p:cNvPr>
-            <p:cNvSpPr txBox="1"/>
-            <p:nvPr/>
-          </p:nvSpPr>
-          <p:spPr>
-            <a:xfrm>
-              <a:off x="1524000" y="1153390"/>
-              <a:ext cx="2488289" cy="430887"/>
-            </a:xfrm>
-            <a:prstGeom prst="rect">
-              <a:avLst/>
-            </a:prstGeom>
-            <a:grpFill/>
-          </p:spPr>
-          <p:txBody>
-            <a:bodyPr wrap="none" rtlCol="0">
-              <a:spAutoFit/>
-            </a:bodyPr>
-            <a:lstStyle/>
-            <a:p>
-              <a:r>
-                <a:rPr lang="en-US" sz="1500" dirty="0" err="1"/>
-                <a:t>Heteroschodasticity</a:t>
-              </a:r>
-              <a:endParaRPr lang="en-US" sz="1500" dirty="0"/>
-            </a:p>
-          </p:txBody>
-        </p:sp>
-      </p:grpSp>
+          <a:prstGeom prst="rect">
+            <a:avLst/>
+          </a:prstGeom>
+          <a:noFill/>
+        </p:spPr>
+        <p:txBody>
+          <a:bodyPr wrap="none" rtlCol="0">
+            <a:spAutoFit/>
+          </a:bodyPr>
+          <a:lstStyle/>
+          <a:p>
+            <a:r>
+              <a:rPr lang="en-US" sz="2100" dirty="0">
+                <a:solidFill>
+                  <a:srgbClr val="FF0000"/>
+                </a:solidFill>
+              </a:rPr>
+              <a:t>More Realistic</a:t>
+            </a:r>
+          </a:p>
+        </p:txBody>
+      </p:sp>
     </p:spTree>
     <p:extLst>
       <p:ext uri="{BB962C8B-B14F-4D97-AF65-F5344CB8AC3E}">
-        <p14:creationId xmlns:p14="http://schemas.microsoft.com/office/powerpoint/2010/main" val="3795647050"/>
+        <p14:creationId xmlns:p14="http://schemas.microsoft.com/office/powerpoint/2010/main" val="3928218300"/>
       </p:ext>
     </p:extLst>
   </p:cSld>
   <p:clrMapOvr>
     <a:masterClrMapping/>
   </p:clrMapOvr>
-  <p:timing>
-    <p:tnLst>
-      <p:par>
-        <p:cTn id="1" dur="indefinite" restart="never" nodeType="tmRoot">
-          <p:childTnLst>
-            <p:seq concurrent="1" nextAc="seek">
-              <p:cTn id="2" dur="indefinite" nodeType="mainSeq">
-                <p:childTnLst>
-                  <p:par>
-                    <p:cTn id="3" fill="hold">
-                      <p:stCondLst>
-                        <p:cond delay="indefinite"/>
-                      </p:stCondLst>
-                      <p:childTnLst>
-                        <p:par>
-                          <p:cTn id="4" fill="hold">
-                            <p:stCondLst>
-                              <p:cond delay="0"/>
-                            </p:stCondLst>
-                            <p:childTnLst>
-                              <p:par>
-                                <p:cTn id="5" presetID="1" presetClass="entr" presetSubtype="0" fill="hold" nodeType="clickEffect">
-                                  <p:stCondLst>
-                                    <p:cond delay="0"/>
-                                  </p:stCondLst>
-                                  <p:childTnLst>
-                                    <p:set>
-                                      <p:cBhvr>
-                                        <p:cTn id="6" dur="1" fill="hold">
-                                          <p:stCondLst>
-                                            <p:cond delay="0"/>
-                                          </p:stCondLst>
-                                        </p:cTn>
-                                        <p:tgtEl>
-                                          <p:spTgt spid="16"/>
-                                        </p:tgtEl>
-                                        <p:attrNameLst>
-                                          <p:attrName>style.visibility</p:attrName>
-                                        </p:attrNameLst>
-                                      </p:cBhvr>
-                                      <p:to>
-                                        <p:strVal val="visible"/>
-                                      </p:to>
-                                    </p:set>
-                                  </p:childTnLst>
-                                </p:cTn>
-                              </p:par>
-                            </p:childTnLst>
-                          </p:cTn>
-                        </p:par>
-                      </p:childTnLst>
-                    </p:cTn>
-                  </p:par>
-                  <p:par>
-                    <p:cTn id="7" fill="hold">
-                      <p:stCondLst>
-                        <p:cond delay="indefinite"/>
-                      </p:stCondLst>
-                      <p:childTnLst>
-                        <p:par>
-                          <p:cTn id="8" fill="hold">
-                            <p:stCondLst>
-                              <p:cond delay="0"/>
-                            </p:stCondLst>
-                            <p:childTnLst>
-                              <p:par>
-                                <p:cTn id="9" presetID="1" presetClass="entr" presetSubtype="0" fill="hold" nodeType="clickEffect">
-                                  <p:stCondLst>
-                                    <p:cond delay="0"/>
-                                  </p:stCondLst>
-                                  <p:childTnLst>
-                                    <p:set>
-                                      <p:cBhvr>
-                                        <p:cTn id="10" dur="1" fill="hold">
-                                          <p:stCondLst>
-                                            <p:cond delay="0"/>
-                                          </p:stCondLst>
-                                        </p:cTn>
-                                        <p:tgtEl>
-                                          <p:spTgt spid="17"/>
-                                        </p:tgtEl>
-                                        <p:attrNameLst>
-                                          <p:attrName>style.visibility</p:attrName>
-                                        </p:attrNameLst>
-                                      </p:cBhvr>
-                                      <p:to>
-                                        <p:strVal val="visible"/>
-                                      </p:to>
-                                    </p:set>
-                                  </p:childTnLst>
-                                </p:cTn>
-                              </p:par>
-                            </p:childTnLst>
-                          </p:cTn>
-                        </p:par>
-                      </p:childTnLst>
-                    </p:cTn>
-                  </p:par>
-                  <p:par>
-                    <p:cTn id="11" fill="hold">
-                      <p:stCondLst>
-                        <p:cond delay="indefinite"/>
-                      </p:stCondLst>
-                      <p:childTnLst>
-                        <p:par>
-                          <p:cTn id="12" fill="hold">
-                            <p:stCondLst>
-                              <p:cond delay="0"/>
-                            </p:stCondLst>
-                            <p:childTnLst>
-                              <p:par>
-                                <p:cTn id="13" presetID="1" presetClass="entr" presetSubtype="0" fill="hold" nodeType="clickEffect">
-                                  <p:stCondLst>
-                                    <p:cond delay="0"/>
-                                  </p:stCondLst>
-                                  <p:childTnLst>
-                                    <p:set>
-                                      <p:cBhvr>
-                                        <p:cTn id="14" dur="1" fill="hold">
-                                          <p:stCondLst>
-                                            <p:cond delay="0"/>
-                                          </p:stCondLst>
-                                        </p:cTn>
-                                        <p:tgtEl>
-                                          <p:spTgt spid="15"/>
-                                        </p:tgtEl>
-                                        <p:attrNameLst>
-                                          <p:attrName>style.visibility</p:attrName>
-                                        </p:attrNameLst>
-                                      </p:cBhvr>
-                                      <p:to>
-                                        <p:strVal val="visible"/>
-                                      </p:to>
-                                    </p:set>
-                                  </p:childTnLst>
-                                </p:cTn>
-                              </p:par>
-                            </p:childTnLst>
-                          </p:cTn>
-                        </p:par>
-                      </p:childTnLst>
-                    </p:cTn>
-                  </p:par>
-                </p:childTnLst>
-              </p:cTn>
-              <p:prevCondLst>
-                <p:cond evt="onPrev" delay="0">
-                  <p:tgtEl>
-                    <p:sldTgt/>
-                  </p:tgtEl>
-                </p:cond>
-              </p:prevCondLst>
-              <p:nextCondLst>
-                <p:cond evt="onNext" delay="0">
-                  <p:tgtEl>
-                    <p:sldTgt/>
-                  </p:tgtEl>
-                </p:cond>
-              </p:nextCondLst>
-            </p:seq>
-          </p:childTnLst>
-        </p:cTn>
-      </p:par>
-    </p:tnLst>
-  </p:timing>
 </p:sld>
 </file>
 
@@ -14254,284 +14596,96 @@
           <a:p>
             <a:r>
               <a:rPr lang="en-US" dirty="0"/>
-              <a:t>Calculating Residuals</a:t>
+              <a:t>You’ve probably seen this: Someone is a bit too enthusiastic with Excel</a:t>
             </a:r>
           </a:p>
         </p:txBody>
       </p:sp>
-      <mc:AlternateContent xmlns:mc="http://schemas.openxmlformats.org/markup-compatibility/2006">
-        <mc:Choice xmlns:a14="http://schemas.microsoft.com/office/drawing/2010/main" Requires="a14">
-          <p:sp>
-            <p:nvSpPr>
-              <p:cNvPr id="3" name="Content Placeholder 2"/>
-              <p:cNvSpPr>
-                <a:spLocks noGrp="1"/>
-              </p:cNvSpPr>
-              <p:nvPr>
-                <p:ph idx="1"/>
-              </p:nvPr>
-            </p:nvSpPr>
-            <p:spPr/>
-            <p:txBody>
-              <a:bodyPr/>
-              <a:lstStyle/>
-              <a:p>
-                <a:r>
-                  <a:rPr lang="en-US" dirty="0"/>
-                  <a:t>The fitting procedure will attempt to minimize the difference between the model </a:t>
-                </a:r>
-                <a14:m>
-                  <m:oMath xmlns:m="http://schemas.openxmlformats.org/officeDocument/2006/math">
-                    <m:r>
-                      <a:rPr lang="en-US" b="0" i="1" smtClean="0">
-                        <a:latin typeface="Cambria Math" panose="02040503050406030204" pitchFamily="18" charset="0"/>
-                      </a:rPr>
-                      <m:t>𝑓</m:t>
-                    </m:r>
-                  </m:oMath>
-                </a14:m>
-                <a:r>
-                  <a:rPr lang="en-US" dirty="0"/>
-                  <a:t>and the data points </a:t>
-                </a:r>
-                <a14:m>
-                  <m:oMath xmlns:m="http://schemas.openxmlformats.org/officeDocument/2006/math">
-                    <m:sSub>
-                      <m:sSubPr>
-                        <m:ctrlPr>
-                          <a:rPr lang="en-US" b="0" i="1" smtClean="0">
-                            <a:latin typeface="Cambria Math" panose="02040503050406030204" pitchFamily="18" charset="0"/>
-                          </a:rPr>
-                        </m:ctrlPr>
-                      </m:sSubPr>
-                      <m:e>
-                        <m:r>
-                          <a:rPr lang="en-US" b="0" i="1" smtClean="0">
-                            <a:latin typeface="Cambria Math" panose="02040503050406030204" pitchFamily="18" charset="0"/>
-                          </a:rPr>
-                          <m:t>𝑦</m:t>
-                        </m:r>
-                      </m:e>
-                      <m:sub>
-                        <m:r>
-                          <a:rPr lang="en-US" b="0" i="1" smtClean="0">
-                            <a:latin typeface="Cambria Math" panose="02040503050406030204" pitchFamily="18" charset="0"/>
-                          </a:rPr>
-                          <m:t>𝑖</m:t>
-                        </m:r>
-                      </m:sub>
-                    </m:sSub>
-                  </m:oMath>
-                </a14:m>
-                <a:r>
-                  <a:rPr lang="en-US" dirty="0"/>
-                  <a:t>, that is minimize:</a:t>
-                </a:r>
-              </a:p>
-              <a:p>
-                <a:pPr marL="0" indent="0">
-                  <a:buNone/>
-                </a:pPr>
-                <a:endParaRPr lang="en-US" dirty="0"/>
-              </a:p>
-              <a:p>
-                <a:pPr marL="0" indent="0">
-                  <a:buNone/>
-                </a:pPr>
-                <a14:m>
-                  <m:oMathPara xmlns:m="http://schemas.openxmlformats.org/officeDocument/2006/math">
-                    <m:oMathParaPr>
-                      <m:jc m:val="centerGroup"/>
-                    </m:oMathParaPr>
-                    <m:oMath xmlns:m="http://schemas.openxmlformats.org/officeDocument/2006/math">
-                      <m:sSub>
-                        <m:sSubPr>
-                          <m:ctrlPr>
-                            <a:rPr lang="en-US" b="0" i="1" smtClean="0">
-                              <a:latin typeface="Cambria Math" panose="02040503050406030204" pitchFamily="18" charset="0"/>
-                            </a:rPr>
-                          </m:ctrlPr>
-                        </m:sSubPr>
-                        <m:e>
-                          <m:r>
-                            <a:rPr lang="en-US" b="0" i="1" smtClean="0">
-                              <a:latin typeface="Cambria Math" panose="02040503050406030204" pitchFamily="18" charset="0"/>
-                            </a:rPr>
-                            <m:t>𝑦</m:t>
-                          </m:r>
-                        </m:e>
-                        <m:sub>
-                          <m:r>
-                            <a:rPr lang="en-US" b="0" i="1" smtClean="0">
-                              <a:latin typeface="Cambria Math" panose="02040503050406030204" pitchFamily="18" charset="0"/>
-                            </a:rPr>
-                            <m:t>𝑖</m:t>
-                          </m:r>
-                        </m:sub>
-                      </m:sSub>
-                      <m:r>
-                        <a:rPr lang="en-US" b="0" i="1" smtClean="0">
-                          <a:latin typeface="Cambria Math" panose="02040503050406030204" pitchFamily="18" charset="0"/>
-                        </a:rPr>
-                        <m:t>−</m:t>
-                      </m:r>
-                      <m:r>
-                        <a:rPr lang="en-US" b="0" i="1" smtClean="0">
-                          <a:latin typeface="Cambria Math" panose="02040503050406030204" pitchFamily="18" charset="0"/>
-                        </a:rPr>
-                        <m:t>𝑓</m:t>
-                      </m:r>
-                      <m:r>
-                        <a:rPr lang="en-US" b="0" i="1" smtClean="0">
-                          <a:latin typeface="Cambria Math" panose="02040503050406030204" pitchFamily="18" charset="0"/>
-                        </a:rPr>
-                        <m:t>(</m:t>
-                      </m:r>
-                      <m:sSub>
-                        <m:sSubPr>
-                          <m:ctrlPr>
-                            <a:rPr lang="en-US" b="0" i="1" smtClean="0">
-                              <a:latin typeface="Cambria Math" panose="02040503050406030204" pitchFamily="18" charset="0"/>
-                            </a:rPr>
-                          </m:ctrlPr>
-                        </m:sSubPr>
-                        <m:e>
-                          <m:r>
-                            <a:rPr lang="en-US" b="0" i="1" smtClean="0">
-                              <a:latin typeface="Cambria Math" panose="02040503050406030204" pitchFamily="18" charset="0"/>
-                            </a:rPr>
-                            <m:t>𝑥</m:t>
-                          </m:r>
-                        </m:e>
-                        <m:sub>
-                          <m:r>
-                            <a:rPr lang="en-US" b="0" i="1" smtClean="0">
-                              <a:latin typeface="Cambria Math" panose="02040503050406030204" pitchFamily="18" charset="0"/>
-                            </a:rPr>
-                            <m:t>𝑖</m:t>
-                          </m:r>
-                        </m:sub>
-                      </m:sSub>
-                      <m:r>
-                        <a:rPr lang="en-US" b="0" i="1" smtClean="0">
-                          <a:latin typeface="Cambria Math" panose="02040503050406030204" pitchFamily="18" charset="0"/>
-                        </a:rPr>
-                        <m:t>;</m:t>
-                      </m:r>
-                      <m:sSub>
-                        <m:sSubPr>
-                          <m:ctrlPr>
-                            <a:rPr lang="en-US" b="0" i="1" smtClean="0">
-                              <a:latin typeface="Cambria Math" panose="02040503050406030204" pitchFamily="18" charset="0"/>
-                            </a:rPr>
-                          </m:ctrlPr>
-                        </m:sSubPr>
-                        <m:e>
-                          <m:r>
-                            <a:rPr lang="en-US" b="0" i="1" smtClean="0">
-                              <a:latin typeface="Cambria Math" panose="02040503050406030204" pitchFamily="18" charset="0"/>
-                            </a:rPr>
-                            <m:t>𝑝</m:t>
-                          </m:r>
-                        </m:e>
-                        <m:sub>
-                          <m:r>
-                            <a:rPr lang="en-US" b="0" i="1" smtClean="0">
-                              <a:latin typeface="Cambria Math" panose="02040503050406030204" pitchFamily="18" charset="0"/>
-                            </a:rPr>
-                            <m:t>1</m:t>
-                          </m:r>
-                        </m:sub>
-                      </m:sSub>
-                      <m:r>
-                        <a:rPr lang="en-US" b="0" i="1" smtClean="0">
-                          <a:latin typeface="Cambria Math" panose="02040503050406030204" pitchFamily="18" charset="0"/>
-                        </a:rPr>
-                        <m:t>…</m:t>
-                      </m:r>
-                      <m:sSub>
-                        <m:sSubPr>
-                          <m:ctrlPr>
-                            <a:rPr lang="en-US" b="0" i="1" smtClean="0">
-                              <a:latin typeface="Cambria Math" panose="02040503050406030204" pitchFamily="18" charset="0"/>
-                            </a:rPr>
-                          </m:ctrlPr>
-                        </m:sSubPr>
-                        <m:e>
-                          <m:r>
-                            <a:rPr lang="en-US" b="0" i="1" smtClean="0">
-                              <a:latin typeface="Cambria Math" panose="02040503050406030204" pitchFamily="18" charset="0"/>
-                            </a:rPr>
-                            <m:t>𝑝</m:t>
-                          </m:r>
-                        </m:e>
-                        <m:sub>
-                          <m:r>
-                            <a:rPr lang="en-US" b="0" i="1" smtClean="0">
-                              <a:latin typeface="Cambria Math" panose="02040503050406030204" pitchFamily="18" charset="0"/>
-                            </a:rPr>
-                            <m:t>𝑚</m:t>
-                          </m:r>
-                        </m:sub>
-                      </m:sSub>
-                      <m:r>
-                        <a:rPr lang="en-US" b="0" i="1" smtClean="0">
-                          <a:latin typeface="Cambria Math" panose="02040503050406030204" pitchFamily="18" charset="0"/>
-                        </a:rPr>
-                        <m:t>)</m:t>
-                      </m:r>
-                    </m:oMath>
-                  </m:oMathPara>
-                </a14:m>
-                <a:endParaRPr lang="en-US" dirty="0"/>
-              </a:p>
-              <a:p>
-                <a:pPr marL="0" indent="0">
-                  <a:buNone/>
-                </a:pPr>
-                <a:endParaRPr lang="en-US" dirty="0"/>
-              </a:p>
-            </p:txBody>
-          </p:sp>
-        </mc:Choice>
-        <mc:Fallback>
-          <p:sp>
-            <p:nvSpPr>
-              <p:cNvPr id="3" name="Content Placeholder 2"/>
-              <p:cNvSpPr>
-                <a:spLocks noGrp="1" noRot="1" noChangeAspect="1" noMove="1" noResize="1" noEditPoints="1" noAdjustHandles="1" noChangeArrowheads="1" noChangeShapeType="1" noTextEdit="1"/>
-              </p:cNvSpPr>
-              <p:nvPr>
-                <p:ph idx="1"/>
-              </p:nvPr>
-            </p:nvSpPr>
-            <p:spPr>
-              <a:blipFill>
-                <a:blip r:embed="rId2"/>
-                <a:stretch>
-                  <a:fillRect l="-1389" t="-1662"/>
-                </a:stretch>
-              </a:blipFill>
-            </p:spPr>
-            <p:txBody>
-              <a:bodyPr/>
-              <a:lstStyle/>
-              <a:p>
-                <a:r>
-                  <a:rPr lang="en-US">
-                    <a:noFill/>
-                  </a:rPr>
-                  <a:t> </a:t>
-                </a:r>
-              </a:p>
-            </p:txBody>
-          </p:sp>
-        </mc:Fallback>
-      </mc:AlternateContent>
+      <p:sp>
+        <p:nvSpPr>
+          <p:cNvPr id="16" name="TextBox 15"/>
+          <p:cNvSpPr txBox="1"/>
+          <p:nvPr/>
+        </p:nvSpPr>
+        <p:spPr>
+          <a:xfrm>
+            <a:off x="3212712" y="2195469"/>
+            <a:ext cx="2287806" cy="646331"/>
+          </a:xfrm>
+          <a:prstGeom prst="rect">
+            <a:avLst/>
+          </a:prstGeom>
+          <a:noFill/>
+        </p:spPr>
+        <p:txBody>
+          <a:bodyPr wrap="none" rtlCol="0">
+            <a:spAutoFit/>
+          </a:bodyPr>
+          <a:lstStyle/>
+          <a:p>
+            <a:r>
+              <a:rPr lang="en-US" sz="3600" dirty="0">
+                <a:solidFill>
+                  <a:srgbClr val="FF0000"/>
+                </a:solidFill>
+              </a:rPr>
+              <a:t>Overfitting</a:t>
+            </a:r>
+          </a:p>
+        </p:txBody>
+      </p:sp>
+      <p:pic>
+        <p:nvPicPr>
+          <p:cNvPr id="3" name="Picture 2"/>
+          <p:cNvPicPr>
+            <a:picLocks noChangeAspect="1"/>
+          </p:cNvPicPr>
+          <p:nvPr/>
+        </p:nvPicPr>
+        <p:blipFill>
+          <a:blip r:embed="rId2"/>
+          <a:stretch>
+            <a:fillRect/>
+          </a:stretch>
+        </p:blipFill>
+        <p:spPr>
+          <a:xfrm>
+            <a:off x="424240" y="3119439"/>
+            <a:ext cx="3438442" cy="2066723"/>
+          </a:xfrm>
+          <a:prstGeom prst="rect">
+            <a:avLst/>
+          </a:prstGeom>
+        </p:spPr>
+      </p:pic>
+      <p:pic>
+        <p:nvPicPr>
+          <p:cNvPr id="4" name="Picture 3"/>
+          <p:cNvPicPr>
+            <a:picLocks noChangeAspect="1"/>
+          </p:cNvPicPr>
+          <p:nvPr/>
+        </p:nvPicPr>
+        <p:blipFill>
+          <a:blip r:embed="rId3"/>
+          <a:stretch>
+            <a:fillRect/>
+          </a:stretch>
+        </p:blipFill>
+        <p:spPr>
+          <a:xfrm>
+            <a:off x="4426085" y="3069579"/>
+            <a:ext cx="3438442" cy="2066723"/>
+          </a:xfrm>
+          <a:prstGeom prst="rect">
+            <a:avLst/>
+          </a:prstGeom>
+        </p:spPr>
+      </p:pic>
     </p:spTree>
     <p:extLst>
       <p:ext uri="{BB962C8B-B14F-4D97-AF65-F5344CB8AC3E}">
-        <p14:creationId xmlns:p14="http://schemas.microsoft.com/office/powerpoint/2010/main" val="3850330752"/>
+        <p14:creationId xmlns:p14="http://schemas.microsoft.com/office/powerpoint/2010/main" val="1585864490"/>
       </p:ext>
     </p:extLst>
   </p:cSld>

</xml_diff>